<commit_message>
Probelem Statement Diagram Aligned
</commit_message>
<xml_diff>
--- a/niti aayog.pptx
+++ b/niti aayog.pptx
@@ -12167,7 +12167,7 @@
           <a:graphicData uri="http://schemas.openxmlformats.org/presentationml/2006/ole">
             <mc:AlternateContent xmlns:mc="http://schemas.openxmlformats.org/markup-compatibility/2006">
               <mc:Choice xmlns:v="urn:schemas-microsoft-com:vml" Requires="v">
-                <p:oleObj spid="_x0000_s1050" name="Acrobat Document" r:id="rId4" imgW="6027385" imgH="4663156" progId="AcroExch.Document.11">
+                <p:oleObj spid="_x0000_s1051" name="Acrobat Document" r:id="rId4" imgW="6027385" imgH="4663156" progId="AcroExch.Document.11">
                   <p:embed/>
                 </p:oleObj>
               </mc:Choice>
@@ -12809,7 +12809,7 @@
         <p:spPr bwMode="auto">
           <a:xfrm>
             <a:off x="6967416" y="3952632"/>
-            <a:ext cx="685624" cy="685624"/>
+            <a:ext cx="629350" cy="629350"/>
           </a:xfrm>
           <a:prstGeom prst="rect">
             <a:avLst/>
@@ -12834,8 +12834,8 @@
         </p:nvSpPr>
         <p:spPr>
           <a:xfrm>
-            <a:off x="7613090" y="4015506"/>
-            <a:ext cx="1148930" cy="566478"/>
+            <a:off x="7579093" y="4015506"/>
+            <a:ext cx="1182927" cy="566478"/>
           </a:xfrm>
           <a:prstGeom prst="rect">
             <a:avLst/>
@@ -12880,8 +12880,8 @@
         </p:nvSpPr>
         <p:spPr>
           <a:xfrm>
-            <a:off x="7613078" y="4024537"/>
-            <a:ext cx="1115207" cy="584775"/>
+            <a:off x="7565589" y="4024537"/>
+            <a:ext cx="1162697" cy="584775"/>
           </a:xfrm>
           <a:prstGeom prst="rect">
             <a:avLst/>
@@ -12910,8 +12910,8 @@
         </p:nvSpPr>
         <p:spPr>
           <a:xfrm>
-            <a:off x="7613078" y="4648991"/>
-            <a:ext cx="1148930" cy="431224"/>
+            <a:off x="7579081" y="4648991"/>
+            <a:ext cx="1182927" cy="431224"/>
           </a:xfrm>
           <a:prstGeom prst="rect">
             <a:avLst/>
@@ -12960,8 +12960,8 @@
         </p:nvSpPr>
         <p:spPr>
           <a:xfrm>
-            <a:off x="7628906" y="4648991"/>
-            <a:ext cx="1115207" cy="461665"/>
+            <a:off x="7660257" y="4648991"/>
+            <a:ext cx="1083856" cy="461665"/>
           </a:xfrm>
           <a:prstGeom prst="rect">
             <a:avLst/>

</xml_diff>

<commit_message>
Changes in PPT and 2-pager
</commit_message>
<xml_diff>
--- a/niti aayog.pptx
+++ b/niti aayog.pptx
@@ -6,7 +6,7 @@
     <p:sldMasterId id="2147483662" r:id="rId2"/>
   </p:sldMasterIdLst>
   <p:notesMasterIdLst>
-    <p:notesMasterId r:id="rId15"/>
+    <p:notesMasterId r:id="rId13"/>
   </p:notesMasterIdLst>
   <p:sldIdLst>
     <p:sldId id="256" r:id="rId3"/>
@@ -16,35 +16,33 @@
     <p:sldId id="321" r:id="rId7"/>
     <p:sldId id="320" r:id="rId8"/>
     <p:sldId id="316" r:id="rId9"/>
-    <p:sldId id="312" r:id="rId10"/>
-    <p:sldId id="322" r:id="rId11"/>
-    <p:sldId id="319" r:id="rId12"/>
-    <p:sldId id="307" r:id="rId13"/>
-    <p:sldId id="323" r:id="rId14"/>
+    <p:sldId id="322" r:id="rId10"/>
+    <p:sldId id="319" r:id="rId11"/>
+    <p:sldId id="323" r:id="rId12"/>
   </p:sldIdLst>
   <p:sldSz cx="9144000" cy="5143500" type="screen16x9"/>
   <p:notesSz cx="6858000" cy="9144000"/>
   <p:embeddedFontLst>
     <p:embeddedFont>
       <p:font typeface="Calibri" panose="020F0502020204030204" pitchFamily="34" charset="0"/>
-      <p:regular r:id="rId16"/>
-      <p:bold r:id="rId17"/>
-      <p:italic r:id="rId18"/>
-      <p:boldItalic r:id="rId19"/>
+      <p:regular r:id="rId14"/>
+      <p:bold r:id="rId15"/>
+      <p:italic r:id="rId16"/>
+      <p:boldItalic r:id="rId17"/>
     </p:embeddedFont>
     <p:embeddedFont>
       <p:font typeface="Georgia" panose="02040502050405020303" pitchFamily="18" charset="0"/>
-      <p:regular r:id="rId20"/>
-      <p:bold r:id="rId21"/>
-      <p:italic r:id="rId22"/>
-      <p:boldItalic r:id="rId23"/>
+      <p:regular r:id="rId18"/>
+      <p:bold r:id="rId19"/>
+      <p:italic r:id="rId20"/>
+      <p:boldItalic r:id="rId21"/>
     </p:embeddedFont>
     <p:embeddedFont>
       <p:font typeface="Nunito Sans" panose="020B0604020202020204" charset="0"/>
-      <p:regular r:id="rId24"/>
-      <p:bold r:id="rId25"/>
-      <p:italic r:id="rId26"/>
-      <p:boldItalic r:id="rId27"/>
+      <p:regular r:id="rId22"/>
+      <p:bold r:id="rId23"/>
+      <p:italic r:id="rId24"/>
+      <p:boldItalic r:id="rId25"/>
     </p:embeddedFont>
   </p:embeddedFontLst>
   <p:defaultTextStyle>
@@ -277,30 +275,6 @@
     </a:lvl9pPr>
   </p:defaultTextStyle>
   <p:extLst>
-    <p:ext uri="{521415D9-36F7-43E2-AB2F-B90AF26B5E84}">
-      <p14:sectionLst xmlns:p14="http://schemas.microsoft.com/office/powerpoint/2010/main">
-        <p14:section name="Default Section" id="{10E4AFE4-CB01-480B-92FB-AEBBB8EFD71C}">
-          <p14:sldIdLst>
-            <p14:sldId id="256"/>
-          </p14:sldIdLst>
-        </p14:section>
-        <p14:section name="Untitled Section" id="{588B9E89-F263-4401-BC01-C59E44E980EF}">
-          <p14:sldIdLst>
-            <p14:sldId id="318"/>
-            <p14:sldId id="257"/>
-            <p14:sldId id="304"/>
-            <p14:sldId id="321"/>
-            <p14:sldId id="320"/>
-            <p14:sldId id="316"/>
-            <p14:sldId id="312"/>
-            <p14:sldId id="322"/>
-            <p14:sldId id="319"/>
-            <p14:sldId id="307"/>
-            <p14:sldId id="323"/>
-          </p14:sldIdLst>
-        </p14:section>
-      </p14:sectionLst>
-    </p:ext>
     <p:ext uri="{EFAFB233-063F-42B5-8137-9DF3F51BA10A}">
       <p15:sldGuideLst xmlns:p15="http://schemas.microsoft.com/office/powerpoint/2012/main">
         <p15:guide id="1" orient="horz" pos="1620">
@@ -873,224 +847,6 @@
 </file>
 
 <file path=ppt/notesSlides/notesSlide10.xml><?xml version="1.0" encoding="utf-8"?>
-<p:notes xmlns:a="http://schemas.openxmlformats.org/drawingml/2006/main" xmlns:r="http://schemas.openxmlformats.org/officeDocument/2006/relationships" xmlns:p="http://schemas.openxmlformats.org/presentationml/2006/main" showMasterSp="0" showMasterPhAnim="0">
-  <p:cSld>
-    <p:spTree>
-      <p:nvGrpSpPr>
-        <p:cNvPr id="1" name="Shape 100"/>
-        <p:cNvGrpSpPr/>
-        <p:nvPr/>
-      </p:nvGrpSpPr>
-      <p:grpSpPr>
-        <a:xfrm>
-          <a:off x="0" y="0"/>
-          <a:ext cx="0" cy="0"/>
-          <a:chOff x="0" y="0"/>
-          <a:chExt cx="0" cy="0"/>
-        </a:xfrm>
-      </p:grpSpPr>
-      <p:sp>
-        <p:nvSpPr>
-          <p:cNvPr id="101" name="Shape 101"/>
-          <p:cNvSpPr>
-            <a:spLocks noGrp="1" noRot="1" noChangeAspect="1"/>
-          </p:cNvSpPr>
-          <p:nvPr>
-            <p:ph type="sldImg" idx="2"/>
-          </p:nvPr>
-        </p:nvSpPr>
-        <p:spPr>
-          <a:xfrm>
-            <a:off x="381000" y="685800"/>
-            <a:ext cx="6096000" cy="3429000"/>
-          </a:xfrm>
-          <a:custGeom>
-            <a:avLst/>
-            <a:gdLst/>
-            <a:ahLst/>
-            <a:cxnLst/>
-            <a:rect l="0" t="0" r="0" b="0"/>
-            <a:pathLst>
-              <a:path w="120000" h="120000" extrusionOk="0">
-                <a:moveTo>
-                  <a:pt x="0" y="0"/>
-                </a:moveTo>
-                <a:lnTo>
-                  <a:pt x="120000" y="0"/>
-                </a:lnTo>
-                <a:lnTo>
-                  <a:pt x="120000" y="120000"/>
-                </a:lnTo>
-                <a:lnTo>
-                  <a:pt x="0" y="120000"/>
-                </a:lnTo>
-                <a:close/>
-              </a:path>
-            </a:pathLst>
-          </a:custGeom>
-        </p:spPr>
-      </p:sp>
-      <p:sp>
-        <p:nvSpPr>
-          <p:cNvPr id="102" name="Shape 102"/>
-          <p:cNvSpPr txBox="1">
-            <a:spLocks noGrp="1"/>
-          </p:cNvSpPr>
-          <p:nvPr>
-            <p:ph type="body" idx="1"/>
-          </p:nvPr>
-        </p:nvSpPr>
-        <p:spPr>
-          <a:xfrm>
-            <a:off x="685800" y="4343400"/>
-            <a:ext cx="5486400" cy="4114800"/>
-          </a:xfrm>
-          <a:prstGeom prst="rect">
-            <a:avLst/>
-          </a:prstGeom>
-        </p:spPr>
-        <p:txBody>
-          <a:bodyPr spcFirstLastPara="1" wrap="square" lIns="91425" tIns="91425" rIns="91425" bIns="91425" anchor="t" anchorCtr="0">
-            <a:noAutofit/>
-          </a:bodyPr>
-          <a:lstStyle/>
-          <a:p>
-            <a:pPr marL="0" lvl="0" indent="0">
-              <a:spcBef>
-                <a:spcPts val="0"/>
-              </a:spcBef>
-              <a:spcAft>
-                <a:spcPts val="0"/>
-              </a:spcAft>
-              <a:buNone/>
-            </a:pPr>
-            <a:endParaRPr dirty="0"/>
-          </a:p>
-        </p:txBody>
-      </p:sp>
-    </p:spTree>
-    <p:extLst>
-      <p:ext uri="{BB962C8B-B14F-4D97-AF65-F5344CB8AC3E}">
-        <p14:creationId xmlns:p14="http://schemas.microsoft.com/office/powerpoint/2010/main" val="2153172090"/>
-      </p:ext>
-    </p:extLst>
-  </p:cSld>
-  <p:clrMapOvr>
-    <a:masterClrMapping/>
-  </p:clrMapOvr>
-</p:notes>
-</file>
-
-<file path=ppt/notesSlides/notesSlide11.xml><?xml version="1.0" encoding="utf-8"?>
-<p:notes xmlns:a="http://schemas.openxmlformats.org/drawingml/2006/main" xmlns:r="http://schemas.openxmlformats.org/officeDocument/2006/relationships" xmlns:p="http://schemas.openxmlformats.org/presentationml/2006/main" showMasterSp="0" showMasterPhAnim="0">
-  <p:cSld>
-    <p:spTree>
-      <p:nvGrpSpPr>
-        <p:cNvPr id="1" name="Shape 100"/>
-        <p:cNvGrpSpPr/>
-        <p:nvPr/>
-      </p:nvGrpSpPr>
-      <p:grpSpPr>
-        <a:xfrm>
-          <a:off x="0" y="0"/>
-          <a:ext cx="0" cy="0"/>
-          <a:chOff x="0" y="0"/>
-          <a:chExt cx="0" cy="0"/>
-        </a:xfrm>
-      </p:grpSpPr>
-      <p:sp>
-        <p:nvSpPr>
-          <p:cNvPr id="101" name="Shape 101"/>
-          <p:cNvSpPr>
-            <a:spLocks noGrp="1" noRot="1" noChangeAspect="1"/>
-          </p:cNvSpPr>
-          <p:nvPr>
-            <p:ph type="sldImg" idx="2"/>
-          </p:nvPr>
-        </p:nvSpPr>
-        <p:spPr>
-          <a:xfrm>
-            <a:off x="381000" y="685800"/>
-            <a:ext cx="6096000" cy="3429000"/>
-          </a:xfrm>
-          <a:custGeom>
-            <a:avLst/>
-            <a:gdLst/>
-            <a:ahLst/>
-            <a:cxnLst/>
-            <a:rect l="0" t="0" r="0" b="0"/>
-            <a:pathLst>
-              <a:path w="120000" h="120000" extrusionOk="0">
-                <a:moveTo>
-                  <a:pt x="0" y="0"/>
-                </a:moveTo>
-                <a:lnTo>
-                  <a:pt x="120000" y="0"/>
-                </a:lnTo>
-                <a:lnTo>
-                  <a:pt x="120000" y="120000"/>
-                </a:lnTo>
-                <a:lnTo>
-                  <a:pt x="0" y="120000"/>
-                </a:lnTo>
-                <a:close/>
-              </a:path>
-            </a:pathLst>
-          </a:custGeom>
-        </p:spPr>
-      </p:sp>
-      <p:sp>
-        <p:nvSpPr>
-          <p:cNvPr id="102" name="Shape 102"/>
-          <p:cNvSpPr txBox="1">
-            <a:spLocks noGrp="1"/>
-          </p:cNvSpPr>
-          <p:nvPr>
-            <p:ph type="body" idx="1"/>
-          </p:nvPr>
-        </p:nvSpPr>
-        <p:spPr>
-          <a:xfrm>
-            <a:off x="685800" y="4343400"/>
-            <a:ext cx="5486400" cy="4114800"/>
-          </a:xfrm>
-          <a:prstGeom prst="rect">
-            <a:avLst/>
-          </a:prstGeom>
-        </p:spPr>
-        <p:txBody>
-          <a:bodyPr spcFirstLastPara="1" wrap="square" lIns="91425" tIns="91425" rIns="91425" bIns="91425" anchor="t" anchorCtr="0">
-            <a:noAutofit/>
-          </a:bodyPr>
-          <a:lstStyle/>
-          <a:p>
-            <a:pPr marL="0" lvl="0" indent="0">
-              <a:spcBef>
-                <a:spcPts val="0"/>
-              </a:spcBef>
-              <a:spcAft>
-                <a:spcPts val="0"/>
-              </a:spcAft>
-              <a:buNone/>
-            </a:pPr>
-            <a:endParaRPr dirty="0"/>
-          </a:p>
-        </p:txBody>
-      </p:sp>
-    </p:spTree>
-    <p:extLst>
-      <p:ext uri="{BB962C8B-B14F-4D97-AF65-F5344CB8AC3E}">
-        <p14:creationId xmlns:p14="http://schemas.microsoft.com/office/powerpoint/2010/main" val="3313095754"/>
-      </p:ext>
-    </p:extLst>
-  </p:cSld>
-  <p:clrMapOvr>
-    <a:masterClrMapping/>
-  </p:clrMapOvr>
-</p:notes>
-</file>
-
-<file path=ppt/notesSlides/notesSlide12.xml><?xml version="1.0" encoding="utf-8"?>
 <p:notes xmlns:a="http://schemas.openxmlformats.org/drawingml/2006/main" xmlns:r="http://schemas.openxmlformats.org/officeDocument/2006/relationships" xmlns:p="http://schemas.openxmlformats.org/presentationml/2006/main" showMasterSp="0" showMasterPhAnim="0">
   <p:cSld>
     <p:spTree>
@@ -8931,8 +8687,8 @@
         </p:nvSpPr>
         <p:spPr>
           <a:xfrm>
-            <a:off x="91952" y="563624"/>
-            <a:ext cx="2485001" cy="817464"/>
+            <a:off x="234450" y="575501"/>
+            <a:ext cx="2046300" cy="915370"/>
           </a:xfrm>
           <a:prstGeom prst="rect">
             <a:avLst/>
@@ -8944,7 +8700,7 @@
           </a:bodyPr>
           <a:lstStyle/>
           <a:p>
-            <a:pPr marL="0" lvl="0" indent="0" rtl="0">
+            <a:pPr marL="0" lvl="0" indent="0" algn="just" rtl="0">
               <a:spcBef>
                 <a:spcPts val="0"/>
               </a:spcBef>
@@ -8955,7 +8711,7 @@
             </a:pPr>
             <a:r>
               <a:rPr lang="en-IN" b="1" dirty="0"/>
-              <a:t>Ease of Implementation</a:t>
+              <a:t>Architecture Diagram</a:t>
             </a:r>
             <a:endParaRPr b="1" dirty="0"/>
           </a:p>
@@ -9003,596 +8759,12 @@
           </a:p>
         </p:txBody>
       </p:sp>
-      <p:sp>
-        <p:nvSpPr>
-          <p:cNvPr id="3" name="Rectangle 2"/>
-          <p:cNvSpPr/>
-          <p:nvPr/>
-        </p:nvSpPr>
-        <p:spPr>
-          <a:xfrm>
-            <a:off x="3022270" y="611580"/>
-            <a:ext cx="5658592" cy="1579418"/>
-          </a:xfrm>
-          <a:prstGeom prst="rect">
-            <a:avLst/>
-          </a:prstGeom>
-          <a:noFill/>
-          <a:ln>
-            <a:solidFill>
-              <a:schemeClr val="bg1">
-                <a:lumMod val="95000"/>
-              </a:schemeClr>
-            </a:solidFill>
-          </a:ln>
-        </p:spPr>
-        <p:style>
-          <a:lnRef idx="2">
-            <a:schemeClr val="accent1">
-              <a:shade val="50000"/>
-            </a:schemeClr>
-          </a:lnRef>
-          <a:fillRef idx="1">
-            <a:schemeClr val="accent1"/>
-          </a:fillRef>
-          <a:effectRef idx="0">
-            <a:schemeClr val="accent1"/>
-          </a:effectRef>
-          <a:fontRef idx="minor">
-            <a:schemeClr val="lt1"/>
-          </a:fontRef>
-        </p:style>
-        <p:txBody>
-          <a:bodyPr rtlCol="0" anchor="ctr"/>
-          <a:lstStyle/>
-          <a:p>
-            <a:pPr algn="ctr"/>
-            <a:endParaRPr lang="en-IN"/>
-          </a:p>
-        </p:txBody>
-      </p:sp>
-      <p:sp>
-        <p:nvSpPr>
-          <p:cNvPr id="4" name="TextBox 3"/>
-          <p:cNvSpPr txBox="1"/>
-          <p:nvPr/>
-        </p:nvSpPr>
-        <p:spPr>
-          <a:xfrm>
-            <a:off x="4792627" y="682653"/>
-            <a:ext cx="2117887" cy="261610"/>
-          </a:xfrm>
-          <a:prstGeom prst="rect">
-            <a:avLst/>
-          </a:prstGeom>
-          <a:noFill/>
-        </p:spPr>
-        <p:txBody>
-          <a:bodyPr wrap="none" rtlCol="0">
-            <a:spAutoFit/>
-          </a:bodyPr>
-          <a:lstStyle/>
-          <a:p>
-            <a:pPr algn="ctr"/>
-            <a:r>
-              <a:rPr lang="en-IN" sz="1100" b="1" dirty="0"/>
-              <a:t>Infrastructural Requirements</a:t>
-            </a:r>
-          </a:p>
-        </p:txBody>
-      </p:sp>
-      <p:sp>
-        <p:nvSpPr>
-          <p:cNvPr id="5" name="TextBox 4"/>
-          <p:cNvSpPr txBox="1"/>
-          <p:nvPr/>
-        </p:nvSpPr>
-        <p:spPr>
-          <a:xfrm>
-            <a:off x="3170719" y="1086661"/>
-            <a:ext cx="5229317" cy="900246"/>
-          </a:xfrm>
-          <a:prstGeom prst="rect">
-            <a:avLst/>
-          </a:prstGeom>
-          <a:noFill/>
-        </p:spPr>
-        <p:txBody>
-          <a:bodyPr wrap="none" rtlCol="0">
-            <a:spAutoFit/>
-          </a:bodyPr>
-          <a:lstStyle/>
-          <a:p>
-            <a:pPr marL="171450" indent="-171450">
-              <a:buFont typeface="Arial" pitchFamily="34" charset="0"/>
-              <a:buChar char="•"/>
-            </a:pPr>
-            <a:r>
-              <a:rPr lang="en-IN" sz="1050" dirty="0"/>
-              <a:t>Virtual Machines(VMs) on any cloud service provider(Azure, AWS)</a:t>
-            </a:r>
-          </a:p>
-          <a:p>
-            <a:pPr marL="171450" indent="-171450">
-              <a:buFont typeface="Arial" pitchFamily="34" charset="0"/>
-              <a:buChar char="•"/>
-            </a:pPr>
-            <a:r>
-              <a:rPr lang="en-IN" sz="1050" dirty="0"/>
-              <a:t>Mobile phones and desktop computers</a:t>
-            </a:r>
-          </a:p>
-          <a:p>
-            <a:pPr marL="171450" indent="-171450">
-              <a:buFont typeface="Arial" pitchFamily="34" charset="0"/>
-              <a:buChar char="•"/>
-            </a:pPr>
-            <a:r>
-              <a:rPr lang="en-IN" sz="1050" dirty="0"/>
-              <a:t>IT enable the hospitals – establish network, hardware including bio-metric module</a:t>
-            </a:r>
-          </a:p>
-          <a:p>
-            <a:pPr marL="171450" indent="-171450">
-              <a:buFont typeface="Arial" pitchFamily="34" charset="0"/>
-              <a:buChar char="•"/>
-            </a:pPr>
-            <a:endParaRPr lang="en-IN" sz="1050" dirty="0"/>
-          </a:p>
-          <a:p>
-            <a:pPr marL="171450" indent="-171450">
-              <a:buFont typeface="Arial" pitchFamily="34" charset="0"/>
-              <a:buChar char="•"/>
-            </a:pPr>
-            <a:endParaRPr lang="en-IN" sz="1050" dirty="0"/>
-          </a:p>
-        </p:txBody>
-      </p:sp>
-      <p:sp>
-        <p:nvSpPr>
-          <p:cNvPr id="9" name="Rectangle 8"/>
-          <p:cNvSpPr/>
-          <p:nvPr/>
-        </p:nvSpPr>
-        <p:spPr>
-          <a:xfrm>
-            <a:off x="3022270" y="2557479"/>
-            <a:ext cx="5658592" cy="2394448"/>
-          </a:xfrm>
-          <a:prstGeom prst="rect">
-            <a:avLst/>
-          </a:prstGeom>
-          <a:noFill/>
-          <a:ln>
-            <a:solidFill>
-              <a:schemeClr val="bg1">
-                <a:lumMod val="95000"/>
-              </a:schemeClr>
-            </a:solidFill>
-          </a:ln>
-        </p:spPr>
-        <p:style>
-          <a:lnRef idx="2">
-            <a:schemeClr val="accent1">
-              <a:shade val="50000"/>
-            </a:schemeClr>
-          </a:lnRef>
-          <a:fillRef idx="1">
-            <a:schemeClr val="accent1"/>
-          </a:fillRef>
-          <a:effectRef idx="0">
-            <a:schemeClr val="accent1"/>
-          </a:effectRef>
-          <a:fontRef idx="minor">
-            <a:schemeClr val="lt1"/>
-          </a:fontRef>
-        </p:style>
-        <p:txBody>
-          <a:bodyPr rtlCol="0" anchor="ctr"/>
-          <a:lstStyle/>
-          <a:p>
-            <a:pPr algn="ctr"/>
-            <a:endParaRPr lang="en-IN"/>
-          </a:p>
-        </p:txBody>
-      </p:sp>
-      <p:sp>
-        <p:nvSpPr>
-          <p:cNvPr id="10" name="TextBox 9"/>
-          <p:cNvSpPr txBox="1"/>
-          <p:nvPr/>
-        </p:nvSpPr>
-        <p:spPr>
-          <a:xfrm>
-            <a:off x="5316002" y="2628549"/>
-            <a:ext cx="1071126" cy="261610"/>
-          </a:xfrm>
-          <a:prstGeom prst="rect">
-            <a:avLst/>
-          </a:prstGeom>
-          <a:noFill/>
-        </p:spPr>
-        <p:txBody>
-          <a:bodyPr wrap="none" rtlCol="0">
-            <a:spAutoFit/>
-          </a:bodyPr>
-          <a:lstStyle/>
-          <a:p>
-            <a:pPr algn="ctr"/>
-            <a:r>
-              <a:rPr lang="en-IN" sz="1100" b="1" dirty="0"/>
-              <a:t>Stakeholders</a:t>
-            </a:r>
-          </a:p>
-        </p:txBody>
-      </p:sp>
-      <p:sp>
-        <p:nvSpPr>
-          <p:cNvPr id="12" name="TextBox 11"/>
-          <p:cNvSpPr txBox="1"/>
-          <p:nvPr/>
-        </p:nvSpPr>
-        <p:spPr>
-          <a:xfrm>
-            <a:off x="3170717" y="3032557"/>
-            <a:ext cx="5347939" cy="1708160"/>
-          </a:xfrm>
-          <a:prstGeom prst="rect">
-            <a:avLst/>
-          </a:prstGeom>
-          <a:noFill/>
-        </p:spPr>
-        <p:txBody>
-          <a:bodyPr wrap="none" rtlCol="0">
-            <a:spAutoFit/>
-          </a:bodyPr>
-          <a:lstStyle/>
-          <a:p>
-            <a:pPr marL="171450" indent="-171450">
-              <a:buFont typeface="Arial" pitchFamily="34" charset="0"/>
-              <a:buChar char="•"/>
-            </a:pPr>
-            <a:r>
-              <a:rPr lang="en-IN" sz="1050" dirty="0"/>
-              <a:t>Medical records will be accessed over the </a:t>
-            </a:r>
-            <a:r>
-              <a:rPr lang="en-IN" sz="1050" b="1" dirty="0"/>
-              <a:t>Internet</a:t>
-            </a:r>
-            <a:r>
-              <a:rPr lang="en-IN" sz="1050" dirty="0"/>
-              <a:t> demanding people to be familiar</a:t>
-            </a:r>
-          </a:p>
-          <a:p>
-            <a:r>
-              <a:rPr lang="en-IN" sz="1050" dirty="0"/>
-              <a:t>     with internet.</a:t>
-            </a:r>
-          </a:p>
-          <a:p>
-            <a:pPr marL="171450" indent="-171450">
-              <a:buFont typeface="Arial" pitchFamily="34" charset="0"/>
-              <a:buChar char="•"/>
-            </a:pPr>
-            <a:r>
-              <a:rPr lang="en-IN" sz="1050" dirty="0"/>
-              <a:t>People with internet access can avail the services </a:t>
-            </a:r>
-            <a:r>
-              <a:rPr lang="en-IN" sz="1050" b="1" dirty="0"/>
-              <a:t>using web application</a:t>
-            </a:r>
-            <a:r>
-              <a:rPr lang="en-IN" sz="1050" dirty="0"/>
-              <a:t>.</a:t>
-            </a:r>
-          </a:p>
-          <a:p>
-            <a:pPr marL="171450" indent="-171450">
-              <a:buFont typeface="Arial" pitchFamily="34" charset="0"/>
-              <a:buChar char="•"/>
-            </a:pPr>
-            <a:r>
-              <a:rPr lang="en-IN" sz="1050" dirty="0"/>
-              <a:t>People without internet access can visit the nearby hospital and avail the service</a:t>
-            </a:r>
-          </a:p>
-          <a:p>
-            <a:r>
-              <a:rPr lang="en-IN" sz="1050" dirty="0"/>
-              <a:t>     (</a:t>
-            </a:r>
-            <a:r>
-              <a:rPr lang="en-IN" sz="1050" b="1" dirty="0"/>
-              <a:t>using bio-metric authentication</a:t>
-            </a:r>
-            <a:r>
-              <a:rPr lang="en-IN" sz="1050" dirty="0"/>
-              <a:t>).</a:t>
-            </a:r>
-          </a:p>
-          <a:p>
-            <a:pPr marL="171450" indent="-171450">
-              <a:buFont typeface="Arial" pitchFamily="34" charset="0"/>
-              <a:buChar char="•"/>
-            </a:pPr>
-            <a:r>
-              <a:rPr lang="en-IN" sz="1050" dirty="0"/>
-              <a:t>For hospitals, shifting from their </a:t>
-            </a:r>
-            <a:r>
-              <a:rPr lang="en-IN" sz="1050" b="1" dirty="0"/>
-              <a:t>traditional/current</a:t>
-            </a:r>
-            <a:r>
-              <a:rPr lang="en-IN" sz="1050" dirty="0"/>
-              <a:t> system to </a:t>
-            </a:r>
-            <a:r>
-              <a:rPr lang="en-IN" sz="1050" b="1" dirty="0"/>
-              <a:t>blockchain based </a:t>
-            </a:r>
-          </a:p>
-          <a:p>
-            <a:r>
-              <a:rPr lang="en-IN" sz="1050" b="1" dirty="0"/>
-              <a:t>     scheme </a:t>
-            </a:r>
-            <a:r>
-              <a:rPr lang="en-IN" sz="1050" dirty="0"/>
-              <a:t>might be challenging but the </a:t>
-            </a:r>
-            <a:r>
-              <a:rPr lang="en-IN" sz="1050" b="1" dirty="0"/>
-              <a:t>future</a:t>
-            </a:r>
-            <a:r>
-              <a:rPr lang="en-IN" sz="1050" dirty="0"/>
-              <a:t> outcome would be </a:t>
-            </a:r>
-            <a:r>
-              <a:rPr lang="en-IN" sz="1050" b="1" dirty="0"/>
-              <a:t>highly beneficial</a:t>
-            </a:r>
-            <a:r>
-              <a:rPr lang="en-IN" sz="1050" dirty="0"/>
-              <a:t>.</a:t>
-            </a:r>
-          </a:p>
-          <a:p>
-            <a:pPr marL="171450" indent="-171450">
-              <a:buFont typeface="Arial" pitchFamily="34" charset="0"/>
-              <a:buChar char="•"/>
-            </a:pPr>
-            <a:r>
-              <a:rPr lang="en-IN" sz="1050" b="1" dirty="0"/>
-              <a:t>Partnership</a:t>
-            </a:r>
-            <a:r>
-              <a:rPr lang="en-IN" sz="1050" dirty="0"/>
-              <a:t> with </a:t>
-            </a:r>
-            <a:r>
-              <a:rPr lang="en-IN" sz="1050" b="1" dirty="0"/>
-              <a:t>MNCs</a:t>
-            </a:r>
-            <a:r>
-              <a:rPr lang="en-IN" sz="1050" dirty="0"/>
-              <a:t> for large scale </a:t>
-            </a:r>
-            <a:r>
-              <a:rPr lang="en-IN" sz="1050" b="1" dirty="0"/>
-              <a:t>deployment</a:t>
-            </a:r>
-            <a:r>
-              <a:rPr lang="en-IN" sz="1050" dirty="0"/>
-              <a:t> of software as well as </a:t>
-            </a:r>
-            <a:r>
-              <a:rPr lang="en-IN" sz="1050" b="1" dirty="0"/>
-              <a:t>training</a:t>
-            </a:r>
-            <a:r>
-              <a:rPr lang="en-IN" sz="1050" dirty="0"/>
-              <a:t>.</a:t>
-            </a:r>
-          </a:p>
-          <a:p>
-            <a:endParaRPr lang="en-IN" sz="1050" dirty="0"/>
-          </a:p>
-          <a:p>
-            <a:pPr marL="171450" indent="-171450">
-              <a:buFont typeface="Arial" pitchFamily="34" charset="0"/>
-              <a:buChar char="•"/>
-            </a:pPr>
-            <a:endParaRPr lang="en-IN" sz="1050" dirty="0"/>
-          </a:p>
-        </p:txBody>
-      </p:sp>
-    </p:spTree>
-    <p:extLst>
-      <p:ext uri="{BB962C8B-B14F-4D97-AF65-F5344CB8AC3E}">
-        <p14:creationId xmlns:p14="http://schemas.microsoft.com/office/powerpoint/2010/main" val="3992344039"/>
-      </p:ext>
-    </p:extLst>
-  </p:cSld>
-  <p:clrMapOvr>
-    <a:masterClrMapping/>
-  </p:clrMapOvr>
-</p:sld>
-</file>
-
-<file path=ppt/slides/slide11.xml><?xml version="1.0" encoding="utf-8"?>
-<p:sld xmlns:a="http://schemas.openxmlformats.org/drawingml/2006/main" xmlns:r="http://schemas.openxmlformats.org/officeDocument/2006/relationships" xmlns:p="http://schemas.openxmlformats.org/presentationml/2006/main">
-  <p:cSld>
-    <p:bg>
-      <p:bgPr>
-        <a:solidFill>
-          <a:schemeClr val="accent1">
-            <a:lumMod val="75000"/>
-          </a:schemeClr>
-        </a:solidFill>
-        <a:effectLst/>
-      </p:bgPr>
-    </p:bg>
-    <p:spTree>
-      <p:nvGrpSpPr>
-        <p:cNvPr id="1" name="Shape 103"/>
-        <p:cNvGrpSpPr/>
-        <p:nvPr/>
-      </p:nvGrpSpPr>
-      <p:grpSpPr>
-        <a:xfrm>
-          <a:off x="0" y="0"/>
-          <a:ext cx="0" cy="0"/>
-          <a:chOff x="0" y="0"/>
-          <a:chExt cx="0" cy="0"/>
-        </a:xfrm>
-      </p:grpSpPr>
-      <p:sp>
-        <p:nvSpPr>
-          <p:cNvPr id="104" name="Shape 104"/>
-          <p:cNvSpPr txBox="1">
-            <a:spLocks noGrp="1"/>
-          </p:cNvSpPr>
-          <p:nvPr>
-            <p:ph type="title"/>
-          </p:nvPr>
-        </p:nvSpPr>
-        <p:spPr>
-          <a:xfrm>
-            <a:off x="234450" y="575501"/>
-            <a:ext cx="2046300" cy="915370"/>
-          </a:xfrm>
-          <a:prstGeom prst="rect">
-            <a:avLst/>
-          </a:prstGeom>
-        </p:spPr>
-        <p:txBody>
-          <a:bodyPr spcFirstLastPara="1" wrap="square" lIns="91425" tIns="91425" rIns="91425" bIns="91425" anchor="t" anchorCtr="0">
-            <a:noAutofit/>
-          </a:bodyPr>
-          <a:lstStyle/>
-          <a:p>
-            <a:pPr marL="0" lvl="0" indent="0" algn="just" rtl="0">
-              <a:spcBef>
-                <a:spcPts val="0"/>
-              </a:spcBef>
-              <a:spcAft>
-                <a:spcPts val="0"/>
-              </a:spcAft>
-              <a:buNone/>
-            </a:pPr>
-            <a:r>
-              <a:rPr lang="en-IN" b="1" dirty="0"/>
-              <a:t>Architecture Diagram</a:t>
-            </a:r>
-            <a:endParaRPr b="1" dirty="0"/>
-          </a:p>
-        </p:txBody>
-      </p:sp>
-      <p:sp>
-        <p:nvSpPr>
-          <p:cNvPr id="107" name="Shape 107"/>
-          <p:cNvSpPr txBox="1">
-            <a:spLocks noGrp="1"/>
-          </p:cNvSpPr>
-          <p:nvPr>
-            <p:ph type="sldNum" idx="12"/>
-          </p:nvPr>
-        </p:nvSpPr>
-        <p:spPr>
-          <a:xfrm>
-            <a:off x="8556784" y="4749851"/>
-            <a:ext cx="548700" cy="393600"/>
-          </a:xfrm>
-          <a:prstGeom prst="rect">
-            <a:avLst/>
-          </a:prstGeom>
-        </p:spPr>
-        <p:txBody>
-          <a:bodyPr spcFirstLastPara="1" wrap="square" lIns="91425" tIns="91425" rIns="91425" bIns="91425" anchor="ctr" anchorCtr="0">
-            <a:noAutofit/>
-          </a:bodyPr>
-          <a:lstStyle/>
-          <a:p>
-            <a:pPr marL="0" lvl="0" indent="0">
-              <a:spcBef>
-                <a:spcPts val="0"/>
-              </a:spcBef>
-              <a:spcAft>
-                <a:spcPts val="0"/>
-              </a:spcAft>
-              <a:buNone/>
-            </a:pPr>
-            <a:fld id="{00000000-1234-1234-1234-123412341234}" type="slidenum">
-              <a:rPr lang="en"/>
-              <a:t>11</a:t>
-            </a:fld>
-            <a:endParaRPr dirty="0"/>
-          </a:p>
-        </p:txBody>
-      </p:sp>
-      <p:sp>
-        <p:nvSpPr>
-          <p:cNvPr id="4" name="Rectangle: Rounded Corners 3">
+      <p:pic>
+        <p:nvPicPr>
+          <p:cNvPr id="8" name="Picture 7">
             <a:extLst>
               <a:ext uri="{FF2B5EF4-FFF2-40B4-BE49-F238E27FC236}">
-                <a16:creationId xmlns:a16="http://schemas.microsoft.com/office/drawing/2014/main" id="{843BD0C3-32D7-46FB-B2BD-05506C6ED87A}"/>
-              </a:ext>
-            </a:extLst>
-          </p:cNvPr>
-          <p:cNvSpPr/>
-          <p:nvPr/>
-        </p:nvSpPr>
-        <p:spPr>
-          <a:xfrm>
-            <a:off x="4555340" y="4241800"/>
-            <a:ext cx="1928813" cy="749300"/>
-          </a:xfrm>
-          <a:prstGeom prst="roundRect">
-            <a:avLst/>
-          </a:prstGeom>
-          <a:solidFill>
-            <a:schemeClr val="bg2">
-              <a:lumMod val="20000"/>
-              <a:lumOff val="80000"/>
-            </a:schemeClr>
-          </a:solidFill>
-        </p:spPr>
-        <p:style>
-          <a:lnRef idx="2">
-            <a:schemeClr val="accent1">
-              <a:shade val="50000"/>
-            </a:schemeClr>
-          </a:lnRef>
-          <a:fillRef idx="1">
-            <a:schemeClr val="accent1"/>
-          </a:fillRef>
-          <a:effectRef idx="0">
-            <a:schemeClr val="accent1"/>
-          </a:effectRef>
-          <a:fontRef idx="minor">
-            <a:schemeClr val="lt1"/>
-          </a:fontRef>
-        </p:style>
-        <p:txBody>
-          <a:bodyPr rtlCol="0" anchor="ctr"/>
-          <a:lstStyle/>
-          <a:p>
-            <a:pPr algn="ctr"/>
-            <a:endParaRPr lang="en-IN"/>
-          </a:p>
-        </p:txBody>
-      </p:sp>
-      <p:pic>
-        <p:nvPicPr>
-          <p:cNvPr id="10" name="Picture 9">
-            <a:extLst>
-              <a:ext uri="{FF2B5EF4-FFF2-40B4-BE49-F238E27FC236}">
-                <a16:creationId xmlns:a16="http://schemas.microsoft.com/office/drawing/2014/main" id="{5607A744-FFC0-4290-81AB-03FCE9C35937}"/>
+                <a16:creationId xmlns:a16="http://schemas.microsoft.com/office/drawing/2014/main" id="{64AD041A-87B0-4E0A-86F0-63196DECE8FF}"/>
               </a:ext>
             </a:extLst>
           </p:cNvPr>
@@ -9609,2599 +8781,14 @@
         </p:blipFill>
         <p:spPr>
           <a:xfrm>
-            <a:off x="4641057" y="4318001"/>
-            <a:ext cx="628650" cy="628650"/>
+            <a:off x="2640649" y="0"/>
+            <a:ext cx="6503351" cy="5076202"/>
           </a:xfrm>
           <a:prstGeom prst="rect">
             <a:avLst/>
           </a:prstGeom>
         </p:spPr>
       </p:pic>
-      <p:pic>
-        <p:nvPicPr>
-          <p:cNvPr id="12" name="Picture 11">
-            <a:extLst>
-              <a:ext uri="{FF2B5EF4-FFF2-40B4-BE49-F238E27FC236}">
-                <a16:creationId xmlns:a16="http://schemas.microsoft.com/office/drawing/2014/main" id="{28BA34AB-C9D2-49FF-992D-B36AB0C11195}"/>
-              </a:ext>
-            </a:extLst>
-          </p:cNvPr>
-          <p:cNvPicPr>
-            <a:picLocks noChangeAspect="1"/>
-          </p:cNvPicPr>
-          <p:nvPr/>
-        </p:nvPicPr>
-        <p:blipFill>
-          <a:blip r:embed="rId4"/>
-          <a:stretch>
-            <a:fillRect/>
-          </a:stretch>
-        </p:blipFill>
-        <p:spPr>
-          <a:xfrm>
-            <a:off x="5269707" y="4241800"/>
-            <a:ext cx="1123950" cy="749300"/>
-          </a:xfrm>
-          <a:prstGeom prst="rect">
-            <a:avLst/>
-          </a:prstGeom>
-        </p:spPr>
-      </p:pic>
-      <p:sp>
-        <p:nvSpPr>
-          <p:cNvPr id="15" name="Rectangle 14">
-            <a:extLst>
-              <a:ext uri="{FF2B5EF4-FFF2-40B4-BE49-F238E27FC236}">
-                <a16:creationId xmlns:a16="http://schemas.microsoft.com/office/drawing/2014/main" id="{AFC5DBF7-20C9-4692-ABC4-95D74DC8D8A6}"/>
-              </a:ext>
-            </a:extLst>
-          </p:cNvPr>
-          <p:cNvSpPr/>
-          <p:nvPr/>
-        </p:nvSpPr>
-        <p:spPr>
-          <a:xfrm>
-            <a:off x="3736188" y="1971677"/>
-            <a:ext cx="3607595" cy="1819275"/>
-          </a:xfrm>
-          <a:prstGeom prst="rect">
-            <a:avLst/>
-          </a:prstGeom>
-          <a:solidFill>
-            <a:schemeClr val="bg2">
-              <a:lumMod val="20000"/>
-              <a:lumOff val="80000"/>
-            </a:schemeClr>
-          </a:solidFill>
-        </p:spPr>
-        <p:style>
-          <a:lnRef idx="2">
-            <a:schemeClr val="accent1">
-              <a:shade val="50000"/>
-            </a:schemeClr>
-          </a:lnRef>
-          <a:fillRef idx="1">
-            <a:schemeClr val="accent1"/>
-          </a:fillRef>
-          <a:effectRef idx="0">
-            <a:schemeClr val="accent1"/>
-          </a:effectRef>
-          <a:fontRef idx="minor">
-            <a:schemeClr val="lt1"/>
-          </a:fontRef>
-        </p:style>
-        <p:txBody>
-          <a:bodyPr rtlCol="0" anchor="ctr"/>
-          <a:lstStyle/>
-          <a:p>
-            <a:endParaRPr lang="en-IN" dirty="0"/>
-          </a:p>
-        </p:txBody>
-      </p:sp>
-      <p:sp>
-        <p:nvSpPr>
-          <p:cNvPr id="16" name="TextBox 15">
-            <a:extLst>
-              <a:ext uri="{FF2B5EF4-FFF2-40B4-BE49-F238E27FC236}">
-                <a16:creationId xmlns:a16="http://schemas.microsoft.com/office/drawing/2014/main" id="{023A6BF3-5E79-46E6-8082-BC7D49BFE591}"/>
-              </a:ext>
-            </a:extLst>
-          </p:cNvPr>
-          <p:cNvSpPr txBox="1"/>
-          <p:nvPr/>
-        </p:nvSpPr>
-        <p:spPr>
-          <a:xfrm>
-            <a:off x="4657129" y="1971679"/>
-            <a:ext cx="1649016" cy="276999"/>
-          </a:xfrm>
-          <a:prstGeom prst="rect">
-            <a:avLst/>
-          </a:prstGeom>
-          <a:noFill/>
-        </p:spPr>
-        <p:txBody>
-          <a:bodyPr wrap="square" rtlCol="0">
-            <a:spAutoFit/>
-          </a:bodyPr>
-          <a:lstStyle/>
-          <a:p>
-            <a:pPr algn="ctr"/>
-            <a:r>
-              <a:rPr lang="en-IN" sz="1200" b="1" dirty="0">
-                <a:latin typeface="Nunito Sans" panose="020B0604020202020204" charset="0"/>
-              </a:rPr>
-              <a:t>Blockchain Network</a:t>
-            </a:r>
-          </a:p>
-        </p:txBody>
-      </p:sp>
-      <p:sp>
-        <p:nvSpPr>
-          <p:cNvPr id="17" name="TextBox 16">
-            <a:extLst>
-              <a:ext uri="{FF2B5EF4-FFF2-40B4-BE49-F238E27FC236}">
-                <a16:creationId xmlns:a16="http://schemas.microsoft.com/office/drawing/2014/main" id="{EED3F5BE-FBC4-4052-B8A3-C98434F32CBB}"/>
-              </a:ext>
-            </a:extLst>
-          </p:cNvPr>
-          <p:cNvSpPr txBox="1"/>
-          <p:nvPr/>
-        </p:nvSpPr>
-        <p:spPr>
-          <a:xfrm>
-            <a:off x="3736181" y="2937361"/>
-            <a:ext cx="1378746" cy="707886"/>
-          </a:xfrm>
-          <a:prstGeom prst="rect">
-            <a:avLst/>
-          </a:prstGeom>
-          <a:noFill/>
-        </p:spPr>
-        <p:txBody>
-          <a:bodyPr wrap="square" rtlCol="0">
-            <a:spAutoFit/>
-          </a:bodyPr>
-          <a:lstStyle/>
-          <a:p>
-            <a:r>
-              <a:rPr lang="en-IN" sz="800" b="1" dirty="0">
-                <a:latin typeface="Nunito Sans" panose="020B0604020202020204" charset="0"/>
-              </a:rPr>
-              <a:t>DISTRIBUTED LEDGER</a:t>
-            </a:r>
-          </a:p>
-          <a:p>
-            <a:r>
-              <a:rPr lang="en-IN" sz="800" b="1" dirty="0">
-                <a:latin typeface="Nunito Sans" panose="020B0604020202020204" charset="0"/>
-              </a:rPr>
-              <a:t>CRYPTOGRAPHY</a:t>
-            </a:r>
-          </a:p>
-          <a:p>
-            <a:r>
-              <a:rPr lang="en-IN" sz="800" b="1" dirty="0">
-                <a:latin typeface="Nunito Sans" panose="020B0604020202020204" charset="0"/>
-              </a:rPr>
-              <a:t>DATA IMMUTABILITY</a:t>
-            </a:r>
-          </a:p>
-          <a:p>
-            <a:r>
-              <a:rPr lang="en-IN" sz="800" b="1" dirty="0">
-                <a:latin typeface="Nunito Sans" panose="020B0604020202020204" charset="0"/>
-              </a:rPr>
-              <a:t>SMART CONTRACTS</a:t>
-            </a:r>
-          </a:p>
-          <a:p>
-            <a:r>
-              <a:rPr lang="en-IN" sz="800" b="1" dirty="0">
-                <a:latin typeface="Nunito Sans" panose="020B0604020202020204" charset="0"/>
-              </a:rPr>
-              <a:t>PROOF-OF-AUTHORITY</a:t>
-            </a:r>
-          </a:p>
-        </p:txBody>
-      </p:sp>
-      <p:sp>
-        <p:nvSpPr>
-          <p:cNvPr id="18" name="Rectangle 17">
-            <a:extLst>
-              <a:ext uri="{FF2B5EF4-FFF2-40B4-BE49-F238E27FC236}">
-                <a16:creationId xmlns:a16="http://schemas.microsoft.com/office/drawing/2014/main" id="{0492E675-102A-4C23-A99A-9054E8235FD0}"/>
-              </a:ext>
-            </a:extLst>
-          </p:cNvPr>
-          <p:cNvSpPr/>
-          <p:nvPr/>
-        </p:nvSpPr>
-        <p:spPr>
-          <a:xfrm>
-            <a:off x="5076824" y="2600326"/>
-            <a:ext cx="923926" cy="1112664"/>
-          </a:xfrm>
-          <a:prstGeom prst="rect">
-            <a:avLst/>
-          </a:prstGeom>
-          <a:solidFill>
-            <a:schemeClr val="bg1"/>
-          </a:solidFill>
-          <a:ln w="12700">
-            <a:solidFill>
-              <a:schemeClr val="tx1"/>
-            </a:solidFill>
-          </a:ln>
-        </p:spPr>
-        <p:style>
-          <a:lnRef idx="2">
-            <a:schemeClr val="accent1">
-              <a:shade val="50000"/>
-            </a:schemeClr>
-          </a:lnRef>
-          <a:fillRef idx="1">
-            <a:schemeClr val="accent1"/>
-          </a:fillRef>
-          <a:effectRef idx="0">
-            <a:schemeClr val="accent1"/>
-          </a:effectRef>
-          <a:fontRef idx="minor">
-            <a:schemeClr val="lt1"/>
-          </a:fontRef>
-        </p:style>
-        <p:txBody>
-          <a:bodyPr rtlCol="0" anchor="ctr"/>
-          <a:lstStyle/>
-          <a:p>
-            <a:pPr algn="ctr"/>
-            <a:endParaRPr lang="en-IN"/>
-          </a:p>
-        </p:txBody>
-      </p:sp>
-      <p:sp>
-        <p:nvSpPr>
-          <p:cNvPr id="22" name="Rectangle 21">
-            <a:extLst>
-              <a:ext uri="{FF2B5EF4-FFF2-40B4-BE49-F238E27FC236}">
-                <a16:creationId xmlns:a16="http://schemas.microsoft.com/office/drawing/2014/main" id="{D0F90942-A638-4814-881A-6FD114E7B509}"/>
-              </a:ext>
-            </a:extLst>
-          </p:cNvPr>
-          <p:cNvSpPr/>
-          <p:nvPr/>
-        </p:nvSpPr>
-        <p:spPr>
-          <a:xfrm>
-            <a:off x="5153025" y="2676528"/>
-            <a:ext cx="781050" cy="968722"/>
-          </a:xfrm>
-          <a:prstGeom prst="rect">
-            <a:avLst/>
-          </a:prstGeom>
-          <a:solidFill>
-            <a:schemeClr val="bg1"/>
-          </a:solidFill>
-          <a:ln>
-            <a:solidFill>
-              <a:schemeClr val="tx1"/>
-            </a:solidFill>
-          </a:ln>
-        </p:spPr>
-        <p:style>
-          <a:lnRef idx="2">
-            <a:schemeClr val="accent1">
-              <a:shade val="50000"/>
-            </a:schemeClr>
-          </a:lnRef>
-          <a:fillRef idx="1">
-            <a:schemeClr val="accent1"/>
-          </a:fillRef>
-          <a:effectRef idx="0">
-            <a:schemeClr val="accent1"/>
-          </a:effectRef>
-          <a:fontRef idx="minor">
-            <a:schemeClr val="lt1"/>
-          </a:fontRef>
-        </p:style>
-        <p:txBody>
-          <a:bodyPr rtlCol="0" anchor="ctr"/>
-          <a:lstStyle/>
-          <a:p>
-            <a:pPr algn="ctr"/>
-            <a:endParaRPr lang="en-IN"/>
-          </a:p>
-        </p:txBody>
-      </p:sp>
-      <p:sp>
-        <p:nvSpPr>
-          <p:cNvPr id="25" name="Rectangle 24">
-            <a:extLst>
-              <a:ext uri="{FF2B5EF4-FFF2-40B4-BE49-F238E27FC236}">
-                <a16:creationId xmlns:a16="http://schemas.microsoft.com/office/drawing/2014/main" id="{154057BD-2E1A-4B33-A862-1EA3D6EF58C5}"/>
-              </a:ext>
-            </a:extLst>
-          </p:cNvPr>
-          <p:cNvSpPr/>
-          <p:nvPr/>
-        </p:nvSpPr>
-        <p:spPr>
-          <a:xfrm>
-            <a:off x="5229226" y="2726250"/>
-            <a:ext cx="619124" cy="155062"/>
-          </a:xfrm>
-          <a:prstGeom prst="rect">
-            <a:avLst/>
-          </a:prstGeom>
-          <a:solidFill>
-            <a:schemeClr val="bg1"/>
-          </a:solidFill>
-          <a:ln w="12700">
-            <a:solidFill>
-              <a:schemeClr val="tx1"/>
-            </a:solidFill>
-          </a:ln>
-        </p:spPr>
-        <p:style>
-          <a:lnRef idx="2">
-            <a:schemeClr val="accent1">
-              <a:shade val="50000"/>
-            </a:schemeClr>
-          </a:lnRef>
-          <a:fillRef idx="1">
-            <a:schemeClr val="accent1"/>
-          </a:fillRef>
-          <a:effectRef idx="0">
-            <a:schemeClr val="accent1"/>
-          </a:effectRef>
-          <a:fontRef idx="minor">
-            <a:schemeClr val="lt1"/>
-          </a:fontRef>
-        </p:style>
-        <p:txBody>
-          <a:bodyPr rtlCol="0" anchor="ctr"/>
-          <a:lstStyle/>
-          <a:p>
-            <a:pPr algn="ctr"/>
-            <a:r>
-              <a:rPr lang="en-IN" sz="800" dirty="0">
-                <a:solidFill>
-                  <a:schemeClr val="tx1"/>
-                </a:solidFill>
-                <a:latin typeface="Nunito Sans" panose="020B0604020202020204" charset="0"/>
-              </a:rPr>
-              <a:t>UID</a:t>
-            </a:r>
-          </a:p>
-        </p:txBody>
-      </p:sp>
-      <p:sp>
-        <p:nvSpPr>
-          <p:cNvPr id="26" name="Rectangle 25">
-            <a:extLst>
-              <a:ext uri="{FF2B5EF4-FFF2-40B4-BE49-F238E27FC236}">
-                <a16:creationId xmlns:a16="http://schemas.microsoft.com/office/drawing/2014/main" id="{BA57485B-FA09-4FC5-82CB-05FDB2129EEB}"/>
-              </a:ext>
-            </a:extLst>
-          </p:cNvPr>
-          <p:cNvSpPr/>
-          <p:nvPr/>
-        </p:nvSpPr>
-        <p:spPr>
-          <a:xfrm>
-            <a:off x="5229226" y="2919004"/>
-            <a:ext cx="619124" cy="155062"/>
-          </a:xfrm>
-          <a:prstGeom prst="rect">
-            <a:avLst/>
-          </a:prstGeom>
-          <a:solidFill>
-            <a:schemeClr val="bg1"/>
-          </a:solidFill>
-          <a:ln w="12700">
-            <a:solidFill>
-              <a:schemeClr val="tx1"/>
-            </a:solidFill>
-          </a:ln>
-        </p:spPr>
-        <p:style>
-          <a:lnRef idx="2">
-            <a:schemeClr val="accent1">
-              <a:shade val="50000"/>
-            </a:schemeClr>
-          </a:lnRef>
-          <a:fillRef idx="1">
-            <a:schemeClr val="accent1"/>
-          </a:fillRef>
-          <a:effectRef idx="0">
-            <a:schemeClr val="accent1"/>
-          </a:effectRef>
-          <a:fontRef idx="minor">
-            <a:schemeClr val="lt1"/>
-          </a:fontRef>
-        </p:style>
-        <p:txBody>
-          <a:bodyPr rtlCol="0" anchor="ctr"/>
-          <a:lstStyle/>
-          <a:p>
-            <a:pPr algn="ctr"/>
-            <a:r>
-              <a:rPr lang="en-IN" sz="600" dirty="0">
-                <a:solidFill>
-                  <a:schemeClr val="tx1"/>
-                </a:solidFill>
-                <a:latin typeface="Nunito Sans" panose="020B0604020202020204" charset="0"/>
-              </a:rPr>
-              <a:t>Owners Public Key</a:t>
-            </a:r>
-          </a:p>
-        </p:txBody>
-      </p:sp>
-      <p:sp>
-        <p:nvSpPr>
-          <p:cNvPr id="27" name="Rectangle 26">
-            <a:extLst>
-              <a:ext uri="{FF2B5EF4-FFF2-40B4-BE49-F238E27FC236}">
-                <a16:creationId xmlns:a16="http://schemas.microsoft.com/office/drawing/2014/main" id="{C59EFCD6-8E4F-4E95-9E3C-470238F3D3B8}"/>
-              </a:ext>
-            </a:extLst>
-          </p:cNvPr>
-          <p:cNvSpPr/>
-          <p:nvPr/>
-        </p:nvSpPr>
-        <p:spPr>
-          <a:xfrm>
-            <a:off x="5229226" y="3127064"/>
-            <a:ext cx="619124" cy="155062"/>
-          </a:xfrm>
-          <a:prstGeom prst="rect">
-            <a:avLst/>
-          </a:prstGeom>
-          <a:solidFill>
-            <a:schemeClr val="bg1"/>
-          </a:solidFill>
-          <a:ln w="12700">
-            <a:solidFill>
-              <a:schemeClr val="tx1"/>
-            </a:solidFill>
-          </a:ln>
-        </p:spPr>
-        <p:style>
-          <a:lnRef idx="2">
-            <a:schemeClr val="accent1">
-              <a:shade val="50000"/>
-            </a:schemeClr>
-          </a:lnRef>
-          <a:fillRef idx="1">
-            <a:schemeClr val="accent1"/>
-          </a:fillRef>
-          <a:effectRef idx="0">
-            <a:schemeClr val="accent1"/>
-          </a:effectRef>
-          <a:fontRef idx="minor">
-            <a:schemeClr val="lt1"/>
-          </a:fontRef>
-        </p:style>
-        <p:txBody>
-          <a:bodyPr rtlCol="0" anchor="ctr"/>
-          <a:lstStyle/>
-          <a:p>
-            <a:pPr algn="ctr"/>
-            <a:r>
-              <a:rPr lang="en-IN" sz="600" dirty="0">
-                <a:solidFill>
-                  <a:schemeClr val="tx1"/>
-                </a:solidFill>
-                <a:latin typeface="Nunito Sans" panose="020B0604020202020204" charset="0"/>
-              </a:rPr>
-              <a:t>Private key of Uploader</a:t>
-            </a:r>
-          </a:p>
-        </p:txBody>
-      </p:sp>
-      <p:sp>
-        <p:nvSpPr>
-          <p:cNvPr id="28" name="Rectangle 27">
-            <a:extLst>
-              <a:ext uri="{FF2B5EF4-FFF2-40B4-BE49-F238E27FC236}">
-                <a16:creationId xmlns:a16="http://schemas.microsoft.com/office/drawing/2014/main" id="{0CD1F687-ED89-46F6-B285-627337E61F1F}"/>
-              </a:ext>
-            </a:extLst>
-          </p:cNvPr>
-          <p:cNvSpPr/>
-          <p:nvPr/>
-        </p:nvSpPr>
-        <p:spPr>
-          <a:xfrm>
-            <a:off x="5229226" y="3335127"/>
-            <a:ext cx="619124" cy="273263"/>
-          </a:xfrm>
-          <a:prstGeom prst="rect">
-            <a:avLst/>
-          </a:prstGeom>
-          <a:solidFill>
-            <a:schemeClr val="bg1"/>
-          </a:solidFill>
-          <a:ln w="12700">
-            <a:solidFill>
-              <a:schemeClr val="tx1"/>
-            </a:solidFill>
-          </a:ln>
-        </p:spPr>
-        <p:style>
-          <a:lnRef idx="2">
-            <a:schemeClr val="accent1">
-              <a:shade val="50000"/>
-            </a:schemeClr>
-          </a:lnRef>
-          <a:fillRef idx="1">
-            <a:schemeClr val="accent1"/>
-          </a:fillRef>
-          <a:effectRef idx="0">
-            <a:schemeClr val="accent1"/>
-          </a:effectRef>
-          <a:fontRef idx="minor">
-            <a:schemeClr val="lt1"/>
-          </a:fontRef>
-        </p:style>
-        <p:txBody>
-          <a:bodyPr rtlCol="0" anchor="ctr"/>
-          <a:lstStyle/>
-          <a:p>
-            <a:pPr algn="ctr"/>
-            <a:r>
-              <a:rPr lang="en-IN" sz="600" dirty="0">
-                <a:solidFill>
-                  <a:schemeClr val="tx1"/>
-                </a:solidFill>
-                <a:latin typeface="Nunito Sans" panose="020B0604020202020204" charset="0"/>
-              </a:rPr>
-              <a:t>Address of file stored in IPFS</a:t>
-            </a:r>
-          </a:p>
-        </p:txBody>
-      </p:sp>
-      <p:sp>
-        <p:nvSpPr>
-          <p:cNvPr id="29" name="Rectangle 28">
-            <a:extLst>
-              <a:ext uri="{FF2B5EF4-FFF2-40B4-BE49-F238E27FC236}">
-                <a16:creationId xmlns:a16="http://schemas.microsoft.com/office/drawing/2014/main" id="{4050DBEE-3D9A-422E-8D5D-6333921F2156}"/>
-              </a:ext>
-            </a:extLst>
-          </p:cNvPr>
-          <p:cNvSpPr/>
-          <p:nvPr/>
-        </p:nvSpPr>
-        <p:spPr>
-          <a:xfrm>
-            <a:off x="5429556" y="2276530"/>
-            <a:ext cx="447377" cy="178650"/>
-          </a:xfrm>
-          <a:prstGeom prst="rect">
-            <a:avLst/>
-          </a:prstGeom>
-          <a:solidFill>
-            <a:schemeClr val="bg1"/>
-          </a:solidFill>
-          <a:ln w="12700">
-            <a:solidFill>
-              <a:schemeClr val="tx1"/>
-            </a:solidFill>
-          </a:ln>
-        </p:spPr>
-        <p:style>
-          <a:lnRef idx="2">
-            <a:schemeClr val="accent1">
-              <a:shade val="50000"/>
-            </a:schemeClr>
-          </a:lnRef>
-          <a:fillRef idx="1">
-            <a:schemeClr val="accent1"/>
-          </a:fillRef>
-          <a:effectRef idx="0">
-            <a:schemeClr val="accent1"/>
-          </a:effectRef>
-          <a:fontRef idx="minor">
-            <a:schemeClr val="lt1"/>
-          </a:fontRef>
-        </p:style>
-        <p:txBody>
-          <a:bodyPr rtlCol="0" anchor="ctr"/>
-          <a:lstStyle/>
-          <a:p>
-            <a:pPr algn="ctr"/>
-            <a:r>
-              <a:rPr lang="en-IN" sz="800" dirty="0">
-                <a:solidFill>
-                  <a:schemeClr val="tx1"/>
-                </a:solidFill>
-                <a:latin typeface="Nunito Sans" panose="020B0604020202020204" charset="0"/>
-              </a:rPr>
-              <a:t>Hash</a:t>
-            </a:r>
-          </a:p>
-        </p:txBody>
-      </p:sp>
-      <p:sp>
-        <p:nvSpPr>
-          <p:cNvPr id="30" name="Rectangle 29">
-            <a:extLst>
-              <a:ext uri="{FF2B5EF4-FFF2-40B4-BE49-F238E27FC236}">
-                <a16:creationId xmlns:a16="http://schemas.microsoft.com/office/drawing/2014/main" id="{769F5C51-049B-4184-A473-DEA47407D812}"/>
-              </a:ext>
-            </a:extLst>
-          </p:cNvPr>
-          <p:cNvSpPr/>
-          <p:nvPr/>
-        </p:nvSpPr>
-        <p:spPr>
-          <a:xfrm>
-            <a:off x="6560351" y="2276530"/>
-            <a:ext cx="447377" cy="178650"/>
-          </a:xfrm>
-          <a:prstGeom prst="rect">
-            <a:avLst/>
-          </a:prstGeom>
-          <a:solidFill>
-            <a:schemeClr val="bg1"/>
-          </a:solidFill>
-          <a:ln w="12700">
-            <a:solidFill>
-              <a:schemeClr val="tx1"/>
-            </a:solidFill>
-          </a:ln>
-        </p:spPr>
-        <p:style>
-          <a:lnRef idx="2">
-            <a:schemeClr val="accent1">
-              <a:shade val="50000"/>
-            </a:schemeClr>
-          </a:lnRef>
-          <a:fillRef idx="1">
-            <a:schemeClr val="accent1"/>
-          </a:fillRef>
-          <a:effectRef idx="0">
-            <a:schemeClr val="accent1"/>
-          </a:effectRef>
-          <a:fontRef idx="minor">
-            <a:schemeClr val="lt1"/>
-          </a:fontRef>
-        </p:style>
-        <p:txBody>
-          <a:bodyPr rtlCol="0" anchor="ctr"/>
-          <a:lstStyle/>
-          <a:p>
-            <a:pPr algn="ctr"/>
-            <a:r>
-              <a:rPr lang="en-IN" sz="800" dirty="0">
-                <a:solidFill>
-                  <a:schemeClr val="tx1"/>
-                </a:solidFill>
-                <a:latin typeface="Nunito Sans" panose="020B0604020202020204" charset="0"/>
-              </a:rPr>
-              <a:t>Hash</a:t>
-            </a:r>
-          </a:p>
-        </p:txBody>
-      </p:sp>
-      <p:cxnSp>
-        <p:nvCxnSpPr>
-          <p:cNvPr id="24" name="Straight Arrow Connector 23">
-            <a:extLst>
-              <a:ext uri="{FF2B5EF4-FFF2-40B4-BE49-F238E27FC236}">
-                <a16:creationId xmlns:a16="http://schemas.microsoft.com/office/drawing/2014/main" id="{087D2D5E-80D5-4472-B184-E924AF4AEAFC}"/>
-              </a:ext>
-            </a:extLst>
-          </p:cNvPr>
-          <p:cNvCxnSpPr>
-            <a:cxnSpLocks/>
-            <a:endCxn id="29" idx="1"/>
-          </p:cNvCxnSpPr>
-          <p:nvPr/>
-        </p:nvCxnSpPr>
-        <p:spPr>
-          <a:xfrm>
-            <a:off x="4953000" y="2365855"/>
-            <a:ext cx="476548" cy="0"/>
-          </a:xfrm>
-          <a:prstGeom prst="straightConnector1">
-            <a:avLst/>
-          </a:prstGeom>
-          <a:ln>
-            <a:solidFill>
-              <a:schemeClr val="tx1"/>
-            </a:solidFill>
-            <a:tailEnd type="triangle"/>
-          </a:ln>
-        </p:spPr>
-        <p:style>
-          <a:lnRef idx="1">
-            <a:schemeClr val="accent1"/>
-          </a:lnRef>
-          <a:fillRef idx="0">
-            <a:schemeClr val="accent1"/>
-          </a:fillRef>
-          <a:effectRef idx="0">
-            <a:schemeClr val="accent1"/>
-          </a:effectRef>
-          <a:fontRef idx="minor">
-            <a:schemeClr val="tx1"/>
-          </a:fontRef>
-        </p:style>
-      </p:cxnSp>
-      <p:cxnSp>
-        <p:nvCxnSpPr>
-          <p:cNvPr id="97" name="Straight Arrow Connector 96">
-            <a:extLst>
-              <a:ext uri="{FF2B5EF4-FFF2-40B4-BE49-F238E27FC236}">
-                <a16:creationId xmlns:a16="http://schemas.microsoft.com/office/drawing/2014/main" id="{A2E3D67A-2862-446F-99DF-032FE55BDEBF}"/>
-              </a:ext>
-            </a:extLst>
-          </p:cNvPr>
-          <p:cNvCxnSpPr/>
-          <p:nvPr/>
-        </p:nvCxnSpPr>
-        <p:spPr>
-          <a:xfrm>
-            <a:off x="5153033" y="2455180"/>
-            <a:ext cx="276523" cy="0"/>
-          </a:xfrm>
-          <a:prstGeom prst="straightConnector1">
-            <a:avLst/>
-          </a:prstGeom>
-          <a:ln>
-            <a:solidFill>
-              <a:schemeClr val="tx1"/>
-            </a:solidFill>
-            <a:tailEnd type="triangle"/>
-          </a:ln>
-        </p:spPr>
-        <p:style>
-          <a:lnRef idx="1">
-            <a:schemeClr val="accent1"/>
-          </a:lnRef>
-          <a:fillRef idx="0">
-            <a:schemeClr val="accent1"/>
-          </a:fillRef>
-          <a:effectRef idx="0">
-            <a:schemeClr val="accent1"/>
-          </a:effectRef>
-          <a:fontRef idx="minor">
-            <a:schemeClr val="tx1"/>
-          </a:fontRef>
-        </p:style>
-      </p:cxnSp>
-      <p:cxnSp>
-        <p:nvCxnSpPr>
-          <p:cNvPr id="101" name="Straight Connector 100">
-            <a:extLst>
-              <a:ext uri="{FF2B5EF4-FFF2-40B4-BE49-F238E27FC236}">
-                <a16:creationId xmlns:a16="http://schemas.microsoft.com/office/drawing/2014/main" id="{E1AD6D70-9486-49D0-B1DA-E3C03AFB6FAD}"/>
-              </a:ext>
-            </a:extLst>
-          </p:cNvPr>
-          <p:cNvCxnSpPr/>
-          <p:nvPr/>
-        </p:nvCxnSpPr>
-        <p:spPr>
-          <a:xfrm>
-            <a:off x="5153025" y="2455180"/>
-            <a:ext cx="0" cy="145146"/>
-          </a:xfrm>
-          <a:prstGeom prst="line">
-            <a:avLst/>
-          </a:prstGeom>
-          <a:ln>
-            <a:solidFill>
-              <a:schemeClr val="tx1"/>
-            </a:solidFill>
-          </a:ln>
-        </p:spPr>
-        <p:style>
-          <a:lnRef idx="1">
-            <a:schemeClr val="accent1"/>
-          </a:lnRef>
-          <a:fillRef idx="0">
-            <a:schemeClr val="accent1"/>
-          </a:fillRef>
-          <a:effectRef idx="0">
-            <a:schemeClr val="accent1"/>
-          </a:effectRef>
-          <a:fontRef idx="minor">
-            <a:schemeClr val="tx1"/>
-          </a:fontRef>
-        </p:style>
-      </p:cxnSp>
-      <p:cxnSp>
-        <p:nvCxnSpPr>
-          <p:cNvPr id="40" name="Straight Arrow Connector 39">
-            <a:extLst>
-              <a:ext uri="{FF2B5EF4-FFF2-40B4-BE49-F238E27FC236}">
-                <a16:creationId xmlns:a16="http://schemas.microsoft.com/office/drawing/2014/main" id="{5CD1DF49-69F0-43C0-8BF1-A969BECDB581}"/>
-              </a:ext>
-            </a:extLst>
-          </p:cNvPr>
-          <p:cNvCxnSpPr>
-            <a:cxnSpLocks/>
-            <a:endCxn id="30" idx="1"/>
-          </p:cNvCxnSpPr>
-          <p:nvPr/>
-        </p:nvCxnSpPr>
-        <p:spPr>
-          <a:xfrm>
-            <a:off x="5876925" y="2365855"/>
-            <a:ext cx="683420" cy="0"/>
-          </a:xfrm>
-          <a:prstGeom prst="straightConnector1">
-            <a:avLst/>
-          </a:prstGeom>
-          <a:ln>
-            <a:solidFill>
-              <a:schemeClr val="tx1"/>
-            </a:solidFill>
-            <a:tailEnd type="triangle"/>
-          </a:ln>
-        </p:spPr>
-        <p:style>
-          <a:lnRef idx="1">
-            <a:schemeClr val="accent1"/>
-          </a:lnRef>
-          <a:fillRef idx="0">
-            <a:schemeClr val="accent1"/>
-          </a:fillRef>
-          <a:effectRef idx="0">
-            <a:schemeClr val="accent1"/>
-          </a:effectRef>
-          <a:fontRef idx="minor">
-            <a:schemeClr val="tx1"/>
-          </a:fontRef>
-        </p:style>
-      </p:cxnSp>
-      <p:cxnSp>
-        <p:nvCxnSpPr>
-          <p:cNvPr id="42" name="Straight Arrow Connector 41">
-            <a:extLst>
-              <a:ext uri="{FF2B5EF4-FFF2-40B4-BE49-F238E27FC236}">
-                <a16:creationId xmlns:a16="http://schemas.microsoft.com/office/drawing/2014/main" id="{44FEE1DE-8467-4988-9641-7B5464BB4427}"/>
-              </a:ext>
-            </a:extLst>
-          </p:cNvPr>
-          <p:cNvCxnSpPr/>
-          <p:nvPr/>
-        </p:nvCxnSpPr>
-        <p:spPr>
-          <a:xfrm>
-            <a:off x="6283825" y="2443385"/>
-            <a:ext cx="276523" cy="0"/>
-          </a:xfrm>
-          <a:prstGeom prst="straightConnector1">
-            <a:avLst/>
-          </a:prstGeom>
-          <a:ln>
-            <a:solidFill>
-              <a:schemeClr val="tx1"/>
-            </a:solidFill>
-            <a:tailEnd type="triangle"/>
-          </a:ln>
-        </p:spPr>
-        <p:style>
-          <a:lnRef idx="1">
-            <a:schemeClr val="accent1"/>
-          </a:lnRef>
-          <a:fillRef idx="0">
-            <a:schemeClr val="accent1"/>
-          </a:fillRef>
-          <a:effectRef idx="0">
-            <a:schemeClr val="accent1"/>
-          </a:effectRef>
-          <a:fontRef idx="minor">
-            <a:schemeClr val="tx1"/>
-          </a:fontRef>
-        </p:style>
-      </p:cxnSp>
-      <p:cxnSp>
-        <p:nvCxnSpPr>
-          <p:cNvPr id="44" name="Straight Connector 43">
-            <a:extLst>
-              <a:ext uri="{FF2B5EF4-FFF2-40B4-BE49-F238E27FC236}">
-                <a16:creationId xmlns:a16="http://schemas.microsoft.com/office/drawing/2014/main" id="{EE12C0D9-A933-4739-945C-7C5F34FCCB44}"/>
-              </a:ext>
-            </a:extLst>
-          </p:cNvPr>
-          <p:cNvCxnSpPr>
-            <a:cxnSpLocks/>
-          </p:cNvCxnSpPr>
-          <p:nvPr/>
-        </p:nvCxnSpPr>
-        <p:spPr>
-          <a:xfrm>
-            <a:off x="6283822" y="2455182"/>
-            <a:ext cx="0" cy="143386"/>
-          </a:xfrm>
-          <a:prstGeom prst="line">
-            <a:avLst/>
-          </a:prstGeom>
-          <a:ln>
-            <a:solidFill>
-              <a:schemeClr val="tx1"/>
-            </a:solidFill>
-          </a:ln>
-        </p:spPr>
-        <p:style>
-          <a:lnRef idx="1">
-            <a:schemeClr val="accent1"/>
-          </a:lnRef>
-          <a:fillRef idx="0">
-            <a:schemeClr val="accent1"/>
-          </a:fillRef>
-          <a:effectRef idx="0">
-            <a:schemeClr val="accent1"/>
-          </a:effectRef>
-          <a:fontRef idx="minor">
-            <a:schemeClr val="tx1"/>
-          </a:fontRef>
-        </p:style>
-      </p:cxnSp>
-      <p:cxnSp>
-        <p:nvCxnSpPr>
-          <p:cNvPr id="50" name="Straight Arrow Connector 49">
-            <a:extLst>
-              <a:ext uri="{FF2B5EF4-FFF2-40B4-BE49-F238E27FC236}">
-                <a16:creationId xmlns:a16="http://schemas.microsoft.com/office/drawing/2014/main" id="{864D4508-0004-4946-BA02-3CFECBED4007}"/>
-              </a:ext>
-            </a:extLst>
-          </p:cNvPr>
-          <p:cNvCxnSpPr>
-            <a:cxnSpLocks/>
-          </p:cNvCxnSpPr>
-          <p:nvPr/>
-        </p:nvCxnSpPr>
-        <p:spPr>
-          <a:xfrm>
-            <a:off x="7007722" y="2340935"/>
-            <a:ext cx="269378" cy="0"/>
-          </a:xfrm>
-          <a:prstGeom prst="straightConnector1">
-            <a:avLst/>
-          </a:prstGeom>
-          <a:ln>
-            <a:solidFill>
-              <a:schemeClr val="tx1"/>
-            </a:solidFill>
-            <a:tailEnd type="triangle"/>
-          </a:ln>
-        </p:spPr>
-        <p:style>
-          <a:lnRef idx="1">
-            <a:schemeClr val="accent1"/>
-          </a:lnRef>
-          <a:fillRef idx="0">
-            <a:schemeClr val="accent1"/>
-          </a:fillRef>
-          <a:effectRef idx="0">
-            <a:schemeClr val="accent1"/>
-          </a:effectRef>
-          <a:fontRef idx="minor">
-            <a:schemeClr val="tx1"/>
-          </a:fontRef>
-        </p:style>
-      </p:cxnSp>
-      <p:sp>
-        <p:nvSpPr>
-          <p:cNvPr id="55" name="Rectangle 54">
-            <a:extLst>
-              <a:ext uri="{FF2B5EF4-FFF2-40B4-BE49-F238E27FC236}">
-                <a16:creationId xmlns:a16="http://schemas.microsoft.com/office/drawing/2014/main" id="{48B45BCD-4358-4A27-A201-9C8C2C57A847}"/>
-              </a:ext>
-            </a:extLst>
-          </p:cNvPr>
-          <p:cNvSpPr/>
-          <p:nvPr/>
-        </p:nvSpPr>
-        <p:spPr>
-          <a:xfrm>
-            <a:off x="6136491" y="2609409"/>
-            <a:ext cx="971549" cy="1116640"/>
-          </a:xfrm>
-          <a:prstGeom prst="rect">
-            <a:avLst/>
-          </a:prstGeom>
-          <a:solidFill>
-            <a:schemeClr val="bg1"/>
-          </a:solidFill>
-          <a:ln w="12700">
-            <a:solidFill>
-              <a:schemeClr val="tx1"/>
-            </a:solidFill>
-          </a:ln>
-        </p:spPr>
-        <p:style>
-          <a:lnRef idx="2">
-            <a:schemeClr val="accent1">
-              <a:shade val="50000"/>
-            </a:schemeClr>
-          </a:lnRef>
-          <a:fillRef idx="1">
-            <a:schemeClr val="accent1"/>
-          </a:fillRef>
-          <a:effectRef idx="0">
-            <a:schemeClr val="accent1"/>
-          </a:effectRef>
-          <a:fontRef idx="minor">
-            <a:schemeClr val="lt1"/>
-          </a:fontRef>
-        </p:style>
-        <p:txBody>
-          <a:bodyPr rtlCol="0" anchor="ctr"/>
-          <a:lstStyle/>
-          <a:p>
-            <a:pPr algn="ctr"/>
-            <a:endParaRPr lang="en-IN"/>
-          </a:p>
-        </p:txBody>
-      </p:sp>
-      <p:sp>
-        <p:nvSpPr>
-          <p:cNvPr id="56" name="Rectangle 55">
-            <a:extLst>
-              <a:ext uri="{FF2B5EF4-FFF2-40B4-BE49-F238E27FC236}">
-                <a16:creationId xmlns:a16="http://schemas.microsoft.com/office/drawing/2014/main" id="{7AC6E2A8-CF90-4A56-8231-0F44756D7E0E}"/>
-              </a:ext>
-            </a:extLst>
-          </p:cNvPr>
-          <p:cNvSpPr/>
-          <p:nvPr/>
-        </p:nvSpPr>
-        <p:spPr>
-          <a:xfrm>
-            <a:off x="6212683" y="2685957"/>
-            <a:ext cx="781050" cy="640042"/>
-          </a:xfrm>
-          <a:prstGeom prst="rect">
-            <a:avLst/>
-          </a:prstGeom>
-          <a:solidFill>
-            <a:schemeClr val="bg1"/>
-          </a:solidFill>
-          <a:ln>
-            <a:solidFill>
-              <a:schemeClr val="tx1"/>
-            </a:solidFill>
-          </a:ln>
-        </p:spPr>
-        <p:style>
-          <a:lnRef idx="2">
-            <a:schemeClr val="accent1">
-              <a:shade val="50000"/>
-            </a:schemeClr>
-          </a:lnRef>
-          <a:fillRef idx="1">
-            <a:schemeClr val="accent1"/>
-          </a:fillRef>
-          <a:effectRef idx="0">
-            <a:schemeClr val="accent1"/>
-          </a:effectRef>
-          <a:fontRef idx="minor">
-            <a:schemeClr val="lt1"/>
-          </a:fontRef>
-        </p:style>
-        <p:txBody>
-          <a:bodyPr rtlCol="0" anchor="ctr"/>
-          <a:lstStyle/>
-          <a:p>
-            <a:pPr algn="ctr"/>
-            <a:endParaRPr lang="en-IN"/>
-          </a:p>
-        </p:txBody>
-      </p:sp>
-      <p:sp>
-        <p:nvSpPr>
-          <p:cNvPr id="57" name="Rectangle 56">
-            <a:extLst>
-              <a:ext uri="{FF2B5EF4-FFF2-40B4-BE49-F238E27FC236}">
-                <a16:creationId xmlns:a16="http://schemas.microsoft.com/office/drawing/2014/main" id="{AAB3C0DD-DE9D-4FE3-950D-B4A854CCDAF7}"/>
-              </a:ext>
-            </a:extLst>
-          </p:cNvPr>
-          <p:cNvSpPr/>
-          <p:nvPr/>
-        </p:nvSpPr>
-        <p:spPr>
-          <a:xfrm>
-            <a:off x="6272216" y="2763093"/>
-            <a:ext cx="652462" cy="242887"/>
-          </a:xfrm>
-          <a:prstGeom prst="rect">
-            <a:avLst/>
-          </a:prstGeom>
-          <a:solidFill>
-            <a:schemeClr val="bg1"/>
-          </a:solidFill>
-          <a:ln w="12700">
-            <a:solidFill>
-              <a:schemeClr val="tx1"/>
-            </a:solidFill>
-          </a:ln>
-        </p:spPr>
-        <p:style>
-          <a:lnRef idx="2">
-            <a:schemeClr val="accent1">
-              <a:shade val="50000"/>
-            </a:schemeClr>
-          </a:lnRef>
-          <a:fillRef idx="1">
-            <a:schemeClr val="accent1"/>
-          </a:fillRef>
-          <a:effectRef idx="0">
-            <a:schemeClr val="accent1"/>
-          </a:effectRef>
-          <a:fontRef idx="minor">
-            <a:schemeClr val="lt1"/>
-          </a:fontRef>
-        </p:style>
-        <p:txBody>
-          <a:bodyPr rtlCol="0" anchor="ctr"/>
-          <a:lstStyle/>
-          <a:p>
-            <a:pPr algn="ctr"/>
-            <a:r>
-              <a:rPr lang="en-IN" sz="600" dirty="0">
-                <a:solidFill>
-                  <a:schemeClr val="tx1"/>
-                </a:solidFill>
-                <a:latin typeface="Nunito Sans" panose="020B0604020202020204" charset="0"/>
-              </a:rPr>
-              <a:t>Request from public key</a:t>
-            </a:r>
-          </a:p>
-        </p:txBody>
-      </p:sp>
-      <p:sp>
-        <p:nvSpPr>
-          <p:cNvPr id="58" name="Rectangle 57">
-            <a:extLst>
-              <a:ext uri="{FF2B5EF4-FFF2-40B4-BE49-F238E27FC236}">
-                <a16:creationId xmlns:a16="http://schemas.microsoft.com/office/drawing/2014/main" id="{38193A52-B7AC-4BEF-89DC-F578D16C79BE}"/>
-              </a:ext>
-            </a:extLst>
-          </p:cNvPr>
-          <p:cNvSpPr/>
-          <p:nvPr/>
-        </p:nvSpPr>
-        <p:spPr>
-          <a:xfrm>
-            <a:off x="6272216" y="3044299"/>
-            <a:ext cx="652462" cy="242887"/>
-          </a:xfrm>
-          <a:prstGeom prst="rect">
-            <a:avLst/>
-          </a:prstGeom>
-          <a:solidFill>
-            <a:schemeClr val="bg1"/>
-          </a:solidFill>
-          <a:ln w="12700">
-            <a:solidFill>
-              <a:schemeClr val="tx1"/>
-            </a:solidFill>
-          </a:ln>
-        </p:spPr>
-        <p:style>
-          <a:lnRef idx="2">
-            <a:schemeClr val="accent1">
-              <a:shade val="50000"/>
-            </a:schemeClr>
-          </a:lnRef>
-          <a:fillRef idx="1">
-            <a:schemeClr val="accent1"/>
-          </a:fillRef>
-          <a:effectRef idx="0">
-            <a:schemeClr val="accent1"/>
-          </a:effectRef>
-          <a:fontRef idx="minor">
-            <a:schemeClr val="lt1"/>
-          </a:fontRef>
-        </p:style>
-        <p:txBody>
-          <a:bodyPr rtlCol="0" anchor="ctr"/>
-          <a:lstStyle/>
-          <a:p>
-            <a:pPr algn="ctr"/>
-            <a:r>
-              <a:rPr lang="en-IN" sz="600" dirty="0">
-                <a:solidFill>
-                  <a:schemeClr val="tx1"/>
-                </a:solidFill>
-                <a:latin typeface="Nunito Sans" panose="020B0604020202020204" charset="0"/>
-              </a:rPr>
-              <a:t>Request to</a:t>
-            </a:r>
-          </a:p>
-          <a:p>
-            <a:pPr algn="ctr"/>
-            <a:r>
-              <a:rPr lang="en-IN" sz="600" dirty="0">
-                <a:solidFill>
-                  <a:schemeClr val="tx1"/>
-                </a:solidFill>
-                <a:latin typeface="Nunito Sans" panose="020B0604020202020204" charset="0"/>
-              </a:rPr>
-              <a:t> public key</a:t>
-            </a:r>
-          </a:p>
-        </p:txBody>
-      </p:sp>
-      <p:pic>
-        <p:nvPicPr>
-          <p:cNvPr id="59" name="Picture 42">
-            <a:extLst>
-              <a:ext uri="{FF2B5EF4-FFF2-40B4-BE49-F238E27FC236}">
-                <a16:creationId xmlns:a16="http://schemas.microsoft.com/office/drawing/2014/main" id="{2F844B0C-CB90-498F-99F2-41A6C6AA21FE}"/>
-              </a:ext>
-            </a:extLst>
-          </p:cNvPr>
-          <p:cNvPicPr>
-            <a:picLocks noChangeAspect="1" noChangeArrowheads="1"/>
-          </p:cNvPicPr>
-          <p:nvPr/>
-        </p:nvPicPr>
-        <p:blipFill>
-          <a:blip r:embed="rId5">
-            <a:extLst>
-              <a:ext uri="{28A0092B-C50C-407E-A947-70E740481C1C}">
-                <a14:useLocalDpi xmlns:a14="http://schemas.microsoft.com/office/drawing/2010/main" val="0"/>
-              </a:ext>
-            </a:extLst>
-          </a:blip>
-          <a:srcRect/>
-          <a:stretch>
-            <a:fillRect/>
-          </a:stretch>
-        </p:blipFill>
-        <p:spPr bwMode="auto">
-          <a:xfrm>
-            <a:off x="8160012" y="2142324"/>
-            <a:ext cx="831850" cy="831850"/>
-          </a:xfrm>
-          <a:prstGeom prst="rect">
-            <a:avLst/>
-          </a:prstGeom>
-          <a:noFill/>
-          <a:ln>
-            <a:noFill/>
-          </a:ln>
-          <a:extLst>
-            <a:ext uri="{909E8E84-426E-40DD-AFC4-6F175D3DCCD1}">
-              <a14:hiddenFill xmlns:a14="http://schemas.microsoft.com/office/drawing/2010/main">
-                <a:solidFill>
-                  <a:srgbClr val="FFFFFF"/>
-                </a:solidFill>
-              </a14:hiddenFill>
-            </a:ext>
-            <a:ext uri="{91240B29-F687-4F45-9708-019B960494DF}">
-              <a14:hiddenLine xmlns:a14="http://schemas.microsoft.com/office/drawing/2010/main" w="9525">
-                <a:solidFill>
-                  <a:srgbClr val="000000"/>
-                </a:solidFill>
-                <a:miter lim="800000"/>
-                <a:headEnd/>
-                <a:tailEnd/>
-              </a14:hiddenLine>
-            </a:ext>
-          </a:extLst>
-        </p:spPr>
-      </p:pic>
-      <p:pic>
-        <p:nvPicPr>
-          <p:cNvPr id="112" name="Picture 111">
-            <a:extLst>
-              <a:ext uri="{FF2B5EF4-FFF2-40B4-BE49-F238E27FC236}">
-                <a16:creationId xmlns:a16="http://schemas.microsoft.com/office/drawing/2014/main" id="{3554E3BA-44EA-4384-A6BC-6BAEA92A7315}"/>
-              </a:ext>
-            </a:extLst>
-          </p:cNvPr>
-          <p:cNvPicPr>
-            <a:picLocks noChangeAspect="1"/>
-          </p:cNvPicPr>
-          <p:nvPr/>
-        </p:nvPicPr>
-        <p:blipFill>
-          <a:blip r:embed="rId6"/>
-          <a:stretch>
-            <a:fillRect/>
-          </a:stretch>
-        </p:blipFill>
-        <p:spPr>
-          <a:xfrm>
-            <a:off x="8134144" y="494175"/>
-            <a:ext cx="1015985" cy="1015985"/>
-          </a:xfrm>
-          <a:prstGeom prst="rect">
-            <a:avLst/>
-          </a:prstGeom>
-        </p:spPr>
-      </p:pic>
-      <p:sp>
-        <p:nvSpPr>
-          <p:cNvPr id="64" name="Rectangle 63">
-            <a:extLst>
-              <a:ext uri="{FF2B5EF4-FFF2-40B4-BE49-F238E27FC236}">
-                <a16:creationId xmlns:a16="http://schemas.microsoft.com/office/drawing/2014/main" id="{026A8523-BD90-4E59-9735-AF2B4DD3E265}"/>
-              </a:ext>
-            </a:extLst>
-          </p:cNvPr>
-          <p:cNvSpPr/>
-          <p:nvPr/>
-        </p:nvSpPr>
-        <p:spPr>
-          <a:xfrm>
-            <a:off x="6212683" y="3364319"/>
-            <a:ext cx="781050" cy="280931"/>
-          </a:xfrm>
-          <a:prstGeom prst="rect">
-            <a:avLst/>
-          </a:prstGeom>
-          <a:solidFill>
-            <a:schemeClr val="bg1"/>
-          </a:solidFill>
-          <a:ln>
-            <a:solidFill>
-              <a:schemeClr val="tx1"/>
-            </a:solidFill>
-          </a:ln>
-        </p:spPr>
-        <p:style>
-          <a:lnRef idx="2">
-            <a:schemeClr val="accent1">
-              <a:shade val="50000"/>
-            </a:schemeClr>
-          </a:lnRef>
-          <a:fillRef idx="1">
-            <a:schemeClr val="accent1"/>
-          </a:fillRef>
-          <a:effectRef idx="0">
-            <a:schemeClr val="accent1"/>
-          </a:effectRef>
-          <a:fontRef idx="minor">
-            <a:schemeClr val="lt1"/>
-          </a:fontRef>
-        </p:style>
-        <p:txBody>
-          <a:bodyPr rtlCol="0" anchor="ctr"/>
-          <a:lstStyle/>
-          <a:p>
-            <a:pPr algn="ctr"/>
-            <a:endParaRPr lang="en-IN"/>
-          </a:p>
-        </p:txBody>
-      </p:sp>
-      <p:sp>
-        <p:nvSpPr>
-          <p:cNvPr id="66" name="Rectangle 65">
-            <a:extLst>
-              <a:ext uri="{FF2B5EF4-FFF2-40B4-BE49-F238E27FC236}">
-                <a16:creationId xmlns:a16="http://schemas.microsoft.com/office/drawing/2014/main" id="{2AD70DEF-8638-4ACB-BF8A-B86A41A3423D}"/>
-              </a:ext>
-            </a:extLst>
-          </p:cNvPr>
-          <p:cNvSpPr/>
-          <p:nvPr/>
-        </p:nvSpPr>
-        <p:spPr>
-          <a:xfrm>
-            <a:off x="6269835" y="3387462"/>
-            <a:ext cx="652462" cy="242887"/>
-          </a:xfrm>
-          <a:prstGeom prst="rect">
-            <a:avLst/>
-          </a:prstGeom>
-          <a:solidFill>
-            <a:schemeClr val="bg1"/>
-          </a:solidFill>
-          <a:ln w="12700">
-            <a:solidFill>
-              <a:schemeClr val="tx1"/>
-            </a:solidFill>
-          </a:ln>
-        </p:spPr>
-        <p:style>
-          <a:lnRef idx="2">
-            <a:schemeClr val="accent1">
-              <a:shade val="50000"/>
-            </a:schemeClr>
-          </a:lnRef>
-          <a:fillRef idx="1">
-            <a:schemeClr val="accent1"/>
-          </a:fillRef>
-          <a:effectRef idx="0">
-            <a:schemeClr val="accent1"/>
-          </a:effectRef>
-          <a:fontRef idx="minor">
-            <a:schemeClr val="lt1"/>
-          </a:fontRef>
-        </p:style>
-        <p:txBody>
-          <a:bodyPr rtlCol="0" anchor="ctr"/>
-          <a:lstStyle/>
-          <a:p>
-            <a:pPr algn="ctr"/>
-            <a:r>
-              <a:rPr lang="en-IN" sz="600" dirty="0">
-                <a:solidFill>
-                  <a:schemeClr val="tx1"/>
-                </a:solidFill>
-                <a:latin typeface="Nunito Sans" panose="020B0604020202020204" charset="0"/>
-              </a:rPr>
-              <a:t>Access grant transaction</a:t>
-            </a:r>
-          </a:p>
-        </p:txBody>
-      </p:sp>
-      <p:pic>
-        <p:nvPicPr>
-          <p:cNvPr id="116" name="Picture 115">
-            <a:extLst>
-              <a:ext uri="{FF2B5EF4-FFF2-40B4-BE49-F238E27FC236}">
-                <a16:creationId xmlns:a16="http://schemas.microsoft.com/office/drawing/2014/main" id="{B1C8D4B3-5CA5-4ECE-84DD-E4907926740A}"/>
-              </a:ext>
-            </a:extLst>
-          </p:cNvPr>
-          <p:cNvPicPr>
-            <a:picLocks noChangeAspect="1"/>
-          </p:cNvPicPr>
-          <p:nvPr/>
-        </p:nvPicPr>
-        <p:blipFill>
-          <a:blip r:embed="rId7"/>
-          <a:stretch>
-            <a:fillRect/>
-          </a:stretch>
-        </p:blipFill>
-        <p:spPr>
-          <a:xfrm>
-            <a:off x="3538502" y="1736498"/>
-            <a:ext cx="1525067" cy="1525067"/>
-          </a:xfrm>
-          <a:prstGeom prst="rect">
-            <a:avLst/>
-          </a:prstGeom>
-        </p:spPr>
-      </p:pic>
-      <p:sp>
-        <p:nvSpPr>
-          <p:cNvPr id="72" name="Rectangle 71">
-            <a:extLst>
-              <a:ext uri="{FF2B5EF4-FFF2-40B4-BE49-F238E27FC236}">
-                <a16:creationId xmlns:a16="http://schemas.microsoft.com/office/drawing/2014/main" id="{01B320DF-E6AB-4F7E-B0FD-3618D5A6A14F}"/>
-              </a:ext>
-            </a:extLst>
-          </p:cNvPr>
-          <p:cNvSpPr/>
-          <p:nvPr/>
-        </p:nvSpPr>
-        <p:spPr>
-          <a:xfrm>
-            <a:off x="3734997" y="1164838"/>
-            <a:ext cx="3607595" cy="355991"/>
-          </a:xfrm>
-          <a:prstGeom prst="rect">
-            <a:avLst/>
-          </a:prstGeom>
-          <a:solidFill>
-            <a:schemeClr val="bg2">
-              <a:lumMod val="20000"/>
-              <a:lumOff val="80000"/>
-            </a:schemeClr>
-          </a:solidFill>
-        </p:spPr>
-        <p:style>
-          <a:lnRef idx="2">
-            <a:schemeClr val="accent1">
-              <a:shade val="50000"/>
-            </a:schemeClr>
-          </a:lnRef>
-          <a:fillRef idx="1">
-            <a:schemeClr val="accent1"/>
-          </a:fillRef>
-          <a:effectRef idx="0">
-            <a:schemeClr val="accent1"/>
-          </a:effectRef>
-          <a:fontRef idx="minor">
-            <a:schemeClr val="lt1"/>
-          </a:fontRef>
-        </p:style>
-        <p:txBody>
-          <a:bodyPr rtlCol="0" anchor="ctr"/>
-          <a:lstStyle/>
-          <a:p>
-            <a:pPr algn="just"/>
-            <a:r>
-              <a:rPr lang="en-IN" sz="1100" b="1" dirty="0">
-                <a:solidFill>
-                  <a:schemeClr val="tx1"/>
-                </a:solidFill>
-                <a:latin typeface="Nunito Sans" panose="020B0604020202020204" charset="0"/>
-              </a:rPr>
-              <a:t>                Blockchain Access Layer - web3.js (APIs)</a:t>
-            </a:r>
-          </a:p>
-        </p:txBody>
-      </p:sp>
-      <p:sp>
-        <p:nvSpPr>
-          <p:cNvPr id="118" name="Arrow: Up-Down 117">
-            <a:extLst>
-              <a:ext uri="{FF2B5EF4-FFF2-40B4-BE49-F238E27FC236}">
-                <a16:creationId xmlns:a16="http://schemas.microsoft.com/office/drawing/2014/main" id="{F25F6E6C-E50C-4C32-86A1-42F75BD07901}"/>
-              </a:ext>
-            </a:extLst>
-          </p:cNvPr>
-          <p:cNvSpPr/>
-          <p:nvPr/>
-        </p:nvSpPr>
-        <p:spPr>
-          <a:xfrm>
-            <a:off x="5407893" y="3790950"/>
-            <a:ext cx="233214" cy="450850"/>
-          </a:xfrm>
-          <a:prstGeom prst="upDownArrow">
-            <a:avLst/>
-          </a:prstGeom>
-        </p:spPr>
-        <p:style>
-          <a:lnRef idx="2">
-            <a:schemeClr val="accent1">
-              <a:shade val="50000"/>
-            </a:schemeClr>
-          </a:lnRef>
-          <a:fillRef idx="1">
-            <a:schemeClr val="accent1"/>
-          </a:fillRef>
-          <a:effectRef idx="0">
-            <a:schemeClr val="accent1"/>
-          </a:effectRef>
-          <a:fontRef idx="minor">
-            <a:schemeClr val="lt1"/>
-          </a:fontRef>
-        </p:style>
-        <p:txBody>
-          <a:bodyPr rtlCol="0" anchor="ctr"/>
-          <a:lstStyle/>
-          <a:p>
-            <a:pPr algn="ctr"/>
-            <a:endParaRPr lang="en-IN"/>
-          </a:p>
-        </p:txBody>
-      </p:sp>
-      <p:sp>
-        <p:nvSpPr>
-          <p:cNvPr id="74" name="Arrow: Up-Down 73">
-            <a:extLst>
-              <a:ext uri="{FF2B5EF4-FFF2-40B4-BE49-F238E27FC236}">
-                <a16:creationId xmlns:a16="http://schemas.microsoft.com/office/drawing/2014/main" id="{3A769608-CEE7-43E4-BB41-0AA36412BCCE}"/>
-              </a:ext>
-            </a:extLst>
-          </p:cNvPr>
-          <p:cNvSpPr/>
-          <p:nvPr/>
-        </p:nvSpPr>
-        <p:spPr>
-          <a:xfrm>
-            <a:off x="5365030" y="1520829"/>
-            <a:ext cx="233214" cy="452677"/>
-          </a:xfrm>
-          <a:prstGeom prst="upDownArrow">
-            <a:avLst/>
-          </a:prstGeom>
-        </p:spPr>
-        <p:style>
-          <a:lnRef idx="2">
-            <a:schemeClr val="accent1">
-              <a:shade val="50000"/>
-            </a:schemeClr>
-          </a:lnRef>
-          <a:fillRef idx="1">
-            <a:schemeClr val="accent1"/>
-          </a:fillRef>
-          <a:effectRef idx="0">
-            <a:schemeClr val="accent1"/>
-          </a:effectRef>
-          <a:fontRef idx="minor">
-            <a:schemeClr val="lt1"/>
-          </a:fontRef>
-        </p:style>
-        <p:txBody>
-          <a:bodyPr rtlCol="0" anchor="ctr"/>
-          <a:lstStyle/>
-          <a:p>
-            <a:pPr algn="ctr"/>
-            <a:endParaRPr lang="en-IN"/>
-          </a:p>
-        </p:txBody>
-      </p:sp>
-      <p:sp>
-        <p:nvSpPr>
-          <p:cNvPr id="75" name="Arrow: Up-Down 74">
-            <a:extLst>
-              <a:ext uri="{FF2B5EF4-FFF2-40B4-BE49-F238E27FC236}">
-                <a16:creationId xmlns:a16="http://schemas.microsoft.com/office/drawing/2014/main" id="{0C44AF41-EEB6-44F4-8E16-05F60219BD87}"/>
-              </a:ext>
-            </a:extLst>
-          </p:cNvPr>
-          <p:cNvSpPr/>
-          <p:nvPr/>
-        </p:nvSpPr>
-        <p:spPr>
-          <a:xfrm>
-            <a:off x="4219239" y="1524000"/>
-            <a:ext cx="233214" cy="431800"/>
-          </a:xfrm>
-          <a:prstGeom prst="upDownArrow">
-            <a:avLst/>
-          </a:prstGeom>
-        </p:spPr>
-        <p:style>
-          <a:lnRef idx="2">
-            <a:schemeClr val="accent1">
-              <a:shade val="50000"/>
-            </a:schemeClr>
-          </a:lnRef>
-          <a:fillRef idx="1">
-            <a:schemeClr val="accent1"/>
-          </a:fillRef>
-          <a:effectRef idx="0">
-            <a:schemeClr val="accent1"/>
-          </a:effectRef>
-          <a:fontRef idx="minor">
-            <a:schemeClr val="lt1"/>
-          </a:fontRef>
-        </p:style>
-        <p:txBody>
-          <a:bodyPr rtlCol="0" anchor="ctr"/>
-          <a:lstStyle/>
-          <a:p>
-            <a:pPr algn="ctr"/>
-            <a:endParaRPr lang="en-IN"/>
-          </a:p>
-        </p:txBody>
-      </p:sp>
-      <p:sp>
-        <p:nvSpPr>
-          <p:cNvPr id="76" name="Arrow: Up-Down 75">
-            <a:extLst>
-              <a:ext uri="{FF2B5EF4-FFF2-40B4-BE49-F238E27FC236}">
-                <a16:creationId xmlns:a16="http://schemas.microsoft.com/office/drawing/2014/main" id="{FC51E6FE-D368-4B28-8661-798B762CCB75}"/>
-              </a:ext>
-            </a:extLst>
-          </p:cNvPr>
-          <p:cNvSpPr/>
-          <p:nvPr/>
-        </p:nvSpPr>
-        <p:spPr>
-          <a:xfrm>
-            <a:off x="6442438" y="1510160"/>
-            <a:ext cx="233214" cy="452677"/>
-          </a:xfrm>
-          <a:prstGeom prst="upDownArrow">
-            <a:avLst/>
-          </a:prstGeom>
-        </p:spPr>
-        <p:style>
-          <a:lnRef idx="2">
-            <a:schemeClr val="accent1">
-              <a:shade val="50000"/>
-            </a:schemeClr>
-          </a:lnRef>
-          <a:fillRef idx="1">
-            <a:schemeClr val="accent1"/>
-          </a:fillRef>
-          <a:effectRef idx="0">
-            <a:schemeClr val="accent1"/>
-          </a:effectRef>
-          <a:fontRef idx="minor">
-            <a:schemeClr val="lt1"/>
-          </a:fontRef>
-        </p:style>
-        <p:txBody>
-          <a:bodyPr rtlCol="0" anchor="ctr"/>
-          <a:lstStyle/>
-          <a:p>
-            <a:pPr algn="ctr"/>
-            <a:endParaRPr lang="en-IN"/>
-          </a:p>
-        </p:txBody>
-      </p:sp>
-      <p:pic>
-        <p:nvPicPr>
-          <p:cNvPr id="120" name="Picture 119">
-            <a:extLst>
-              <a:ext uri="{FF2B5EF4-FFF2-40B4-BE49-F238E27FC236}">
-                <a16:creationId xmlns:a16="http://schemas.microsoft.com/office/drawing/2014/main" id="{CCA75F24-AF7B-434D-A086-B7BB355744DF}"/>
-              </a:ext>
-            </a:extLst>
-          </p:cNvPr>
-          <p:cNvPicPr>
-            <a:picLocks noChangeAspect="1"/>
-          </p:cNvPicPr>
-          <p:nvPr/>
-        </p:nvPicPr>
-        <p:blipFill>
-          <a:blip r:embed="rId8"/>
-          <a:stretch>
-            <a:fillRect/>
-          </a:stretch>
-        </p:blipFill>
-        <p:spPr>
-          <a:xfrm>
-            <a:off x="4555332" y="45496"/>
-            <a:ext cx="1904136" cy="844167"/>
-          </a:xfrm>
-          <a:prstGeom prst="rect">
-            <a:avLst/>
-          </a:prstGeom>
-        </p:spPr>
-      </p:pic>
-      <p:pic>
-        <p:nvPicPr>
-          <p:cNvPr id="79" name="Picture 50">
-            <a:extLst>
-              <a:ext uri="{FF2B5EF4-FFF2-40B4-BE49-F238E27FC236}">
-                <a16:creationId xmlns:a16="http://schemas.microsoft.com/office/drawing/2014/main" id="{0A4AA348-544D-4A99-933D-85AF7F4035E9}"/>
-              </a:ext>
-            </a:extLst>
-          </p:cNvPr>
-          <p:cNvPicPr>
-            <a:picLocks noChangeAspect="1" noChangeArrowheads="1"/>
-          </p:cNvPicPr>
-          <p:nvPr/>
-        </p:nvPicPr>
-        <p:blipFill>
-          <a:blip r:embed="rId9">
-            <a:extLst>
-              <a:ext uri="{28A0092B-C50C-407E-A947-70E740481C1C}">
-                <a14:useLocalDpi xmlns:a14="http://schemas.microsoft.com/office/drawing/2010/main" val="0"/>
-              </a:ext>
-            </a:extLst>
-          </a:blip>
-          <a:srcRect/>
-          <a:stretch>
-            <a:fillRect/>
-          </a:stretch>
-        </p:blipFill>
-        <p:spPr bwMode="auto">
-          <a:xfrm>
-            <a:off x="8186904" y="3948117"/>
-            <a:ext cx="739775" cy="739775"/>
-          </a:xfrm>
-          <a:prstGeom prst="rect">
-            <a:avLst/>
-          </a:prstGeom>
-          <a:noFill/>
-          <a:ln>
-            <a:noFill/>
-          </a:ln>
-          <a:extLst>
-            <a:ext uri="{909E8E84-426E-40DD-AFC4-6F175D3DCCD1}">
-              <a14:hiddenFill xmlns:a14="http://schemas.microsoft.com/office/drawing/2010/main">
-                <a:solidFill>
-                  <a:srgbClr val="FFFFFF"/>
-                </a:solidFill>
-              </a14:hiddenFill>
-            </a:ext>
-            <a:ext uri="{91240B29-F687-4F45-9708-019B960494DF}">
-              <a14:hiddenLine xmlns:a14="http://schemas.microsoft.com/office/drawing/2010/main" w="9525">
-                <a:solidFill>
-                  <a:srgbClr val="000000"/>
-                </a:solidFill>
-                <a:miter lim="800000"/>
-                <a:headEnd/>
-                <a:tailEnd/>
-              </a14:hiddenLine>
-            </a:ext>
-          </a:extLst>
-        </p:spPr>
-      </p:pic>
-      <p:pic>
-        <p:nvPicPr>
-          <p:cNvPr id="122" name="Picture 121">
-            <a:extLst>
-              <a:ext uri="{FF2B5EF4-FFF2-40B4-BE49-F238E27FC236}">
-                <a16:creationId xmlns:a16="http://schemas.microsoft.com/office/drawing/2014/main" id="{EEBE87C7-8F9C-42B5-A8B0-FE8340D5F6F6}"/>
-              </a:ext>
-            </a:extLst>
-          </p:cNvPr>
-          <p:cNvPicPr>
-            <a:picLocks noChangeAspect="1"/>
-          </p:cNvPicPr>
-          <p:nvPr/>
-        </p:nvPicPr>
-        <p:blipFill>
-          <a:blip r:embed="rId10"/>
-          <a:stretch>
-            <a:fillRect/>
-          </a:stretch>
-        </p:blipFill>
-        <p:spPr>
-          <a:xfrm>
-            <a:off x="3802414" y="1194615"/>
-            <a:ext cx="531463" cy="288478"/>
-          </a:xfrm>
-          <a:prstGeom prst="rect">
-            <a:avLst/>
-          </a:prstGeom>
-        </p:spPr>
-      </p:pic>
-      <p:pic>
-        <p:nvPicPr>
-          <p:cNvPr id="124" name="Picture 123">
-            <a:extLst>
-              <a:ext uri="{FF2B5EF4-FFF2-40B4-BE49-F238E27FC236}">
-                <a16:creationId xmlns:a16="http://schemas.microsoft.com/office/drawing/2014/main" id="{18678D47-7F89-417D-8364-D478D7CED8DB}"/>
-              </a:ext>
-            </a:extLst>
-          </p:cNvPr>
-          <p:cNvPicPr>
-            <a:picLocks noChangeAspect="1"/>
-          </p:cNvPicPr>
-          <p:nvPr/>
-        </p:nvPicPr>
-        <p:blipFill>
-          <a:blip r:embed="rId11"/>
-          <a:stretch>
-            <a:fillRect/>
-          </a:stretch>
-        </p:blipFill>
-        <p:spPr>
-          <a:xfrm>
-            <a:off x="2744116" y="1049745"/>
-            <a:ext cx="660821" cy="578218"/>
-          </a:xfrm>
-          <a:prstGeom prst="rect">
-            <a:avLst/>
-          </a:prstGeom>
-        </p:spPr>
-      </p:pic>
-      <p:pic>
-        <p:nvPicPr>
-          <p:cNvPr id="84" name="Picture 83">
-            <a:extLst>
-              <a:ext uri="{FF2B5EF4-FFF2-40B4-BE49-F238E27FC236}">
-                <a16:creationId xmlns:a16="http://schemas.microsoft.com/office/drawing/2014/main" id="{63BA7092-1D0B-4CDC-9783-89C21CF79E81}"/>
-              </a:ext>
-            </a:extLst>
-          </p:cNvPr>
-          <p:cNvPicPr>
-            <a:picLocks noChangeAspect="1"/>
-          </p:cNvPicPr>
-          <p:nvPr/>
-        </p:nvPicPr>
-        <p:blipFill>
-          <a:blip r:embed="rId11"/>
-          <a:stretch>
-            <a:fillRect/>
-          </a:stretch>
-        </p:blipFill>
-        <p:spPr>
-          <a:xfrm>
-            <a:off x="7486301" y="1080660"/>
-            <a:ext cx="660821" cy="578218"/>
-          </a:xfrm>
-          <a:prstGeom prst="rect">
-            <a:avLst/>
-          </a:prstGeom>
-        </p:spPr>
-      </p:pic>
-      <p:sp>
-        <p:nvSpPr>
-          <p:cNvPr id="127" name="TextBox 126">
-            <a:extLst>
-              <a:ext uri="{FF2B5EF4-FFF2-40B4-BE49-F238E27FC236}">
-                <a16:creationId xmlns:a16="http://schemas.microsoft.com/office/drawing/2014/main" id="{981518DD-AEFF-45B7-8057-DA0E6A9B47C3}"/>
-              </a:ext>
-            </a:extLst>
-          </p:cNvPr>
-          <p:cNvSpPr txBox="1"/>
-          <p:nvPr/>
-        </p:nvSpPr>
-        <p:spPr>
-          <a:xfrm>
-            <a:off x="8147376" y="4709033"/>
-            <a:ext cx="739775" cy="215444"/>
-          </a:xfrm>
-          <a:prstGeom prst="rect">
-            <a:avLst/>
-          </a:prstGeom>
-          <a:noFill/>
-        </p:spPr>
-        <p:txBody>
-          <a:bodyPr wrap="square" rtlCol="0">
-            <a:spAutoFit/>
-          </a:bodyPr>
-          <a:lstStyle/>
-          <a:p>
-            <a:pPr algn="ctr"/>
-            <a:r>
-              <a:rPr lang="en-IN" sz="800" dirty="0">
-                <a:latin typeface="Nunito Sans" panose="020B0604020202020204" charset="0"/>
-              </a:rPr>
-              <a:t>Municipality</a:t>
-            </a:r>
-          </a:p>
-        </p:txBody>
-      </p:sp>
-      <p:sp>
-        <p:nvSpPr>
-          <p:cNvPr id="88" name="TextBox 87">
-            <a:extLst>
-              <a:ext uri="{FF2B5EF4-FFF2-40B4-BE49-F238E27FC236}">
-                <a16:creationId xmlns:a16="http://schemas.microsoft.com/office/drawing/2014/main" id="{F00DA144-301C-4694-8642-5D3A8966255E}"/>
-              </a:ext>
-            </a:extLst>
-          </p:cNvPr>
-          <p:cNvSpPr txBox="1"/>
-          <p:nvPr/>
-        </p:nvSpPr>
-        <p:spPr>
-          <a:xfrm>
-            <a:off x="8225903" y="3031233"/>
-            <a:ext cx="739775" cy="215444"/>
-          </a:xfrm>
-          <a:prstGeom prst="rect">
-            <a:avLst/>
-          </a:prstGeom>
-          <a:noFill/>
-        </p:spPr>
-        <p:txBody>
-          <a:bodyPr wrap="square" rtlCol="0">
-            <a:spAutoFit/>
-          </a:bodyPr>
-          <a:lstStyle/>
-          <a:p>
-            <a:pPr algn="ctr"/>
-            <a:r>
-              <a:rPr lang="en-IN" sz="800" dirty="0">
-                <a:latin typeface="Nunito Sans" panose="020B0604020202020204" charset="0"/>
-              </a:rPr>
-              <a:t>Hospital</a:t>
-            </a:r>
-          </a:p>
-        </p:txBody>
-      </p:sp>
-      <p:sp>
-        <p:nvSpPr>
-          <p:cNvPr id="89" name="TextBox 88">
-            <a:extLst>
-              <a:ext uri="{FF2B5EF4-FFF2-40B4-BE49-F238E27FC236}">
-                <a16:creationId xmlns:a16="http://schemas.microsoft.com/office/drawing/2014/main" id="{D46B7FE0-A4F5-4CCF-ABEC-726AB1EA4193}"/>
-              </a:ext>
-            </a:extLst>
-          </p:cNvPr>
-          <p:cNvSpPr txBox="1"/>
-          <p:nvPr/>
-        </p:nvSpPr>
-        <p:spPr>
-          <a:xfrm>
-            <a:off x="8328908" y="1420337"/>
-            <a:ext cx="739775" cy="215444"/>
-          </a:xfrm>
-          <a:prstGeom prst="rect">
-            <a:avLst/>
-          </a:prstGeom>
-          <a:noFill/>
-        </p:spPr>
-        <p:txBody>
-          <a:bodyPr wrap="square" rtlCol="0">
-            <a:spAutoFit/>
-          </a:bodyPr>
-          <a:lstStyle/>
-          <a:p>
-            <a:pPr algn="ctr"/>
-            <a:r>
-              <a:rPr lang="en-IN" sz="800" dirty="0">
-                <a:latin typeface="Nunito Sans" panose="020B0604020202020204" charset="0"/>
-              </a:rPr>
-              <a:t>Patients</a:t>
-            </a:r>
-          </a:p>
-        </p:txBody>
-      </p:sp>
-      <p:sp>
-        <p:nvSpPr>
-          <p:cNvPr id="32" name="Arrow: Left 31">
-            <a:extLst>
-              <a:ext uri="{FF2B5EF4-FFF2-40B4-BE49-F238E27FC236}">
-                <a16:creationId xmlns:a16="http://schemas.microsoft.com/office/drawing/2014/main" id="{DDEAB656-485B-4BC9-B75B-6FB9CFAABCBF}"/>
-              </a:ext>
-            </a:extLst>
-          </p:cNvPr>
-          <p:cNvSpPr/>
-          <p:nvPr/>
-        </p:nvSpPr>
-        <p:spPr>
-          <a:xfrm>
-            <a:off x="3276607" y="1251497"/>
-            <a:ext cx="458389" cy="231599"/>
-          </a:xfrm>
-          <a:prstGeom prst="leftArrow">
-            <a:avLst/>
-          </a:prstGeom>
-        </p:spPr>
-        <p:style>
-          <a:lnRef idx="2">
-            <a:schemeClr val="accent1">
-              <a:shade val="50000"/>
-            </a:schemeClr>
-          </a:lnRef>
-          <a:fillRef idx="1">
-            <a:schemeClr val="accent1"/>
-          </a:fillRef>
-          <a:effectRef idx="0">
-            <a:schemeClr val="accent1"/>
-          </a:effectRef>
-          <a:fontRef idx="minor">
-            <a:schemeClr val="lt1"/>
-          </a:fontRef>
-        </p:style>
-        <p:txBody>
-          <a:bodyPr rtlCol="0" anchor="ctr"/>
-          <a:lstStyle/>
-          <a:p>
-            <a:pPr algn="ctr"/>
-            <a:endParaRPr lang="en-IN"/>
-          </a:p>
-        </p:txBody>
-      </p:sp>
-      <p:sp>
-        <p:nvSpPr>
-          <p:cNvPr id="33" name="Arrow: Right 32">
-            <a:extLst>
-              <a:ext uri="{FF2B5EF4-FFF2-40B4-BE49-F238E27FC236}">
-                <a16:creationId xmlns:a16="http://schemas.microsoft.com/office/drawing/2014/main" id="{1750CCE7-C1AB-4B99-90EC-12BE38429399}"/>
-              </a:ext>
-            </a:extLst>
-          </p:cNvPr>
-          <p:cNvSpPr/>
-          <p:nvPr/>
-        </p:nvSpPr>
-        <p:spPr>
-          <a:xfrm>
-            <a:off x="7366131" y="1251493"/>
-            <a:ext cx="225301" cy="215444"/>
-          </a:xfrm>
-          <a:prstGeom prst="rightArrow">
-            <a:avLst/>
-          </a:prstGeom>
-        </p:spPr>
-        <p:style>
-          <a:lnRef idx="2">
-            <a:schemeClr val="accent1">
-              <a:shade val="50000"/>
-            </a:schemeClr>
-          </a:lnRef>
-          <a:fillRef idx="1">
-            <a:schemeClr val="accent1"/>
-          </a:fillRef>
-          <a:effectRef idx="0">
-            <a:schemeClr val="accent1"/>
-          </a:effectRef>
-          <a:fontRef idx="minor">
-            <a:schemeClr val="lt1"/>
-          </a:fontRef>
-        </p:style>
-        <p:txBody>
-          <a:bodyPr rtlCol="0" anchor="ctr"/>
-          <a:lstStyle/>
-          <a:p>
-            <a:pPr algn="ctr"/>
-            <a:endParaRPr lang="en-IN"/>
-          </a:p>
-        </p:txBody>
-      </p:sp>
-      <p:sp>
-        <p:nvSpPr>
-          <p:cNvPr id="39" name="Arrow: Right 38">
-            <a:extLst>
-              <a:ext uri="{FF2B5EF4-FFF2-40B4-BE49-F238E27FC236}">
-                <a16:creationId xmlns:a16="http://schemas.microsoft.com/office/drawing/2014/main" id="{75E98987-F062-4A77-B0D7-DF1697A0E167}"/>
-              </a:ext>
-            </a:extLst>
-          </p:cNvPr>
-          <p:cNvSpPr/>
-          <p:nvPr/>
-        </p:nvSpPr>
-        <p:spPr>
-          <a:xfrm>
-            <a:off x="7940028" y="2676526"/>
-            <a:ext cx="271859" cy="204786"/>
-          </a:xfrm>
-          <a:prstGeom prst="rightArrow">
-            <a:avLst/>
-          </a:prstGeom>
-        </p:spPr>
-        <p:style>
-          <a:lnRef idx="2">
-            <a:schemeClr val="accent1">
-              <a:shade val="50000"/>
-            </a:schemeClr>
-          </a:lnRef>
-          <a:fillRef idx="1">
-            <a:schemeClr val="accent1"/>
-          </a:fillRef>
-          <a:effectRef idx="0">
-            <a:schemeClr val="accent1"/>
-          </a:effectRef>
-          <a:fontRef idx="minor">
-            <a:schemeClr val="lt1"/>
-          </a:fontRef>
-        </p:style>
-        <p:txBody>
-          <a:bodyPr rtlCol="0" anchor="ctr"/>
-          <a:lstStyle/>
-          <a:p>
-            <a:pPr algn="ctr"/>
-            <a:endParaRPr lang="en-IN"/>
-          </a:p>
-        </p:txBody>
-      </p:sp>
-      <p:sp>
-        <p:nvSpPr>
-          <p:cNvPr id="128" name="Arrow: Right 127">
-            <a:extLst>
-              <a:ext uri="{FF2B5EF4-FFF2-40B4-BE49-F238E27FC236}">
-                <a16:creationId xmlns:a16="http://schemas.microsoft.com/office/drawing/2014/main" id="{4F61E5B2-0F22-4CF9-962A-8AF8369EA0A4}"/>
-              </a:ext>
-            </a:extLst>
-          </p:cNvPr>
-          <p:cNvSpPr/>
-          <p:nvPr/>
-        </p:nvSpPr>
-        <p:spPr>
-          <a:xfrm>
-            <a:off x="7940028" y="4283782"/>
-            <a:ext cx="271859" cy="152399"/>
-          </a:xfrm>
-          <a:prstGeom prst="rightArrow">
-            <a:avLst/>
-          </a:prstGeom>
-        </p:spPr>
-        <p:style>
-          <a:lnRef idx="2">
-            <a:schemeClr val="accent1">
-              <a:shade val="50000"/>
-            </a:schemeClr>
-          </a:lnRef>
-          <a:fillRef idx="1">
-            <a:schemeClr val="accent1"/>
-          </a:fillRef>
-          <a:effectRef idx="0">
-            <a:schemeClr val="accent1"/>
-          </a:effectRef>
-          <a:fontRef idx="minor">
-            <a:schemeClr val="lt1"/>
-          </a:fontRef>
-        </p:style>
-        <p:txBody>
-          <a:bodyPr rtlCol="0" anchor="ctr"/>
-          <a:lstStyle/>
-          <a:p>
-            <a:pPr algn="ctr"/>
-            <a:endParaRPr lang="en-IN"/>
-          </a:p>
-        </p:txBody>
-      </p:sp>
-      <p:sp>
-        <p:nvSpPr>
-          <p:cNvPr id="130" name="Arrow: Right 129">
-            <a:extLst>
-              <a:ext uri="{FF2B5EF4-FFF2-40B4-BE49-F238E27FC236}">
-                <a16:creationId xmlns:a16="http://schemas.microsoft.com/office/drawing/2014/main" id="{101BB2C6-0A70-4200-A5E9-40341C9AB832}"/>
-              </a:ext>
-            </a:extLst>
-          </p:cNvPr>
-          <p:cNvSpPr/>
-          <p:nvPr/>
-        </p:nvSpPr>
-        <p:spPr>
-          <a:xfrm>
-            <a:off x="8029012" y="1272079"/>
-            <a:ext cx="271859" cy="215444"/>
-          </a:xfrm>
-          <a:prstGeom prst="rightArrow">
-            <a:avLst/>
-          </a:prstGeom>
-        </p:spPr>
-        <p:style>
-          <a:lnRef idx="2">
-            <a:schemeClr val="accent1">
-              <a:shade val="50000"/>
-            </a:schemeClr>
-          </a:lnRef>
-          <a:fillRef idx="1">
-            <a:schemeClr val="accent1"/>
-          </a:fillRef>
-          <a:effectRef idx="0">
-            <a:schemeClr val="accent1"/>
-          </a:effectRef>
-          <a:fontRef idx="minor">
-            <a:schemeClr val="lt1"/>
-          </a:fontRef>
-        </p:style>
-        <p:txBody>
-          <a:bodyPr rtlCol="0" anchor="ctr"/>
-          <a:lstStyle/>
-          <a:p>
-            <a:pPr algn="ctr"/>
-            <a:endParaRPr lang="en-IN"/>
-          </a:p>
-        </p:txBody>
-      </p:sp>
-      <p:sp>
-        <p:nvSpPr>
-          <p:cNvPr id="46" name="Arrow: Left-Up 45">
-            <a:extLst>
-              <a:ext uri="{FF2B5EF4-FFF2-40B4-BE49-F238E27FC236}">
-                <a16:creationId xmlns:a16="http://schemas.microsoft.com/office/drawing/2014/main" id="{01E79B17-5381-4839-9A9C-1E3D662CBF69}"/>
-              </a:ext>
-            </a:extLst>
-          </p:cNvPr>
-          <p:cNvSpPr/>
-          <p:nvPr/>
-        </p:nvSpPr>
-        <p:spPr>
-          <a:xfrm>
-            <a:off x="6510670" y="1673994"/>
-            <a:ext cx="1521224" cy="3142135"/>
-          </a:xfrm>
-          <a:prstGeom prst="leftUpArrow">
-            <a:avLst>
-              <a:gd name="adj1" fmla="val 6509"/>
-              <a:gd name="adj2" fmla="val 11132"/>
-              <a:gd name="adj3" fmla="val 11284"/>
-            </a:avLst>
-          </a:prstGeom>
-        </p:spPr>
-        <p:style>
-          <a:lnRef idx="2">
-            <a:schemeClr val="accent1">
-              <a:shade val="50000"/>
-            </a:schemeClr>
-          </a:lnRef>
-          <a:fillRef idx="1">
-            <a:schemeClr val="accent1"/>
-          </a:fillRef>
-          <a:effectRef idx="0">
-            <a:schemeClr val="accent1"/>
-          </a:effectRef>
-          <a:fontRef idx="minor">
-            <a:schemeClr val="lt1"/>
-          </a:fontRef>
-        </p:style>
-        <p:txBody>
-          <a:bodyPr rtlCol="0" anchor="ctr"/>
-          <a:lstStyle/>
-          <a:p>
-            <a:pPr algn="ctr"/>
-            <a:endParaRPr lang="en-IN"/>
-          </a:p>
-        </p:txBody>
-      </p:sp>
-      <p:sp>
-        <p:nvSpPr>
-          <p:cNvPr id="136" name="Arrow: Left-Up 135">
-            <a:extLst>
-              <a:ext uri="{FF2B5EF4-FFF2-40B4-BE49-F238E27FC236}">
-                <a16:creationId xmlns:a16="http://schemas.microsoft.com/office/drawing/2014/main" id="{770A2473-F18E-4C76-941C-0F5C5F4394B5}"/>
-              </a:ext>
-            </a:extLst>
-          </p:cNvPr>
-          <p:cNvSpPr/>
-          <p:nvPr/>
-        </p:nvSpPr>
-        <p:spPr>
-          <a:xfrm flipH="1">
-            <a:off x="2903557" y="1657748"/>
-            <a:ext cx="1627150" cy="3142135"/>
-          </a:xfrm>
-          <a:prstGeom prst="leftUpArrow">
-            <a:avLst>
-              <a:gd name="adj1" fmla="val 6509"/>
-              <a:gd name="adj2" fmla="val 11132"/>
-              <a:gd name="adj3" fmla="val 11284"/>
-            </a:avLst>
-          </a:prstGeom>
-        </p:spPr>
-        <p:style>
-          <a:lnRef idx="2">
-            <a:schemeClr val="accent1">
-              <a:shade val="50000"/>
-            </a:schemeClr>
-          </a:lnRef>
-          <a:fillRef idx="1">
-            <a:schemeClr val="accent1"/>
-          </a:fillRef>
-          <a:effectRef idx="0">
-            <a:schemeClr val="accent1"/>
-          </a:effectRef>
-          <a:fontRef idx="minor">
-            <a:schemeClr val="lt1"/>
-          </a:fontRef>
-        </p:style>
-        <p:txBody>
-          <a:bodyPr rtlCol="0" anchor="ctr"/>
-          <a:lstStyle/>
-          <a:p>
-            <a:pPr algn="ctr"/>
-            <a:endParaRPr lang="en-IN"/>
-          </a:p>
-        </p:txBody>
-      </p:sp>
-      <p:sp>
-        <p:nvSpPr>
-          <p:cNvPr id="51" name="Arrow: Bent-Up 50">
-            <a:extLst>
-              <a:ext uri="{FF2B5EF4-FFF2-40B4-BE49-F238E27FC236}">
-                <a16:creationId xmlns:a16="http://schemas.microsoft.com/office/drawing/2014/main" id="{55AB17C6-F741-451F-9CA4-5B5C1BDD9A5A}"/>
-              </a:ext>
-            </a:extLst>
-          </p:cNvPr>
-          <p:cNvSpPr/>
-          <p:nvPr/>
-        </p:nvSpPr>
-        <p:spPr>
-          <a:xfrm rot="5400000" flipH="1">
-            <a:off x="3454195" y="-130015"/>
-            <a:ext cx="622702" cy="1530333"/>
-          </a:xfrm>
-          <a:prstGeom prst="bentUpArrow">
-            <a:avLst>
-              <a:gd name="adj1" fmla="val 18881"/>
-              <a:gd name="adj2" fmla="val 25000"/>
-              <a:gd name="adj3" fmla="val 25000"/>
-            </a:avLst>
-          </a:prstGeom>
-        </p:spPr>
-        <p:style>
-          <a:lnRef idx="2">
-            <a:schemeClr val="accent1">
-              <a:shade val="50000"/>
-            </a:schemeClr>
-          </a:lnRef>
-          <a:fillRef idx="1">
-            <a:schemeClr val="accent1"/>
-          </a:fillRef>
-          <a:effectRef idx="0">
-            <a:schemeClr val="accent1"/>
-          </a:effectRef>
-          <a:fontRef idx="minor">
-            <a:schemeClr val="lt1"/>
-          </a:fontRef>
-        </p:style>
-        <p:txBody>
-          <a:bodyPr rtlCol="0" anchor="ctr"/>
-          <a:lstStyle/>
-          <a:p>
-            <a:pPr algn="ctr"/>
-            <a:endParaRPr lang="en-IN"/>
-          </a:p>
-        </p:txBody>
-      </p:sp>
-      <p:sp>
-        <p:nvSpPr>
-          <p:cNvPr id="2" name="TextBox 1">
-            <a:extLst>
-              <a:ext uri="{FF2B5EF4-FFF2-40B4-BE49-F238E27FC236}">
-                <a16:creationId xmlns:a16="http://schemas.microsoft.com/office/drawing/2014/main" id="{C8CCF8C6-DAFA-4BE4-9D03-A21EEB4F4751}"/>
-              </a:ext>
-            </a:extLst>
-          </p:cNvPr>
-          <p:cNvSpPr txBox="1"/>
-          <p:nvPr/>
-        </p:nvSpPr>
-        <p:spPr>
-          <a:xfrm>
-            <a:off x="4660157" y="894441"/>
-            <a:ext cx="1625104" cy="215444"/>
-          </a:xfrm>
-          <a:prstGeom prst="rect">
-            <a:avLst/>
-          </a:prstGeom>
-          <a:noFill/>
-        </p:spPr>
-        <p:txBody>
-          <a:bodyPr wrap="square" rtlCol="0">
-            <a:spAutoFit/>
-          </a:bodyPr>
-          <a:lstStyle/>
-          <a:p>
-            <a:pPr algn="ctr"/>
-            <a:r>
-              <a:rPr lang="en-IN" sz="800" dirty="0"/>
-              <a:t>Insurance Companies</a:t>
-            </a:r>
-          </a:p>
-        </p:txBody>
-      </p:sp>
-    </p:spTree>
-    <p:extLst>
-      <p:ext uri="{BB962C8B-B14F-4D97-AF65-F5344CB8AC3E}">
-        <p14:creationId xmlns:p14="http://schemas.microsoft.com/office/powerpoint/2010/main" val="4074402649"/>
-      </p:ext>
-    </p:extLst>
-  </p:cSld>
-  <p:clrMapOvr>
-    <a:masterClrMapping/>
-  </p:clrMapOvr>
-</p:sld>
-</file>
-
-<file path=ppt/slides/slide12.xml><?xml version="1.0" encoding="utf-8"?>
-<p:sld xmlns:a="http://schemas.openxmlformats.org/drawingml/2006/main" xmlns:r="http://schemas.openxmlformats.org/officeDocument/2006/relationships" xmlns:p="http://schemas.openxmlformats.org/presentationml/2006/main">
-  <p:cSld>
-    <p:bg>
-      <p:bgPr>
-        <a:solidFill>
-          <a:schemeClr val="accent1">
-            <a:lumMod val="75000"/>
-          </a:schemeClr>
-        </a:solidFill>
-        <a:effectLst/>
-      </p:bgPr>
-    </p:bg>
-    <p:spTree>
-      <p:nvGrpSpPr>
-        <p:cNvPr id="1" name="Shape 103"/>
-        <p:cNvGrpSpPr/>
-        <p:nvPr/>
-      </p:nvGrpSpPr>
-      <p:grpSpPr>
-        <a:xfrm>
-          <a:off x="0" y="0"/>
-          <a:ext cx="0" cy="0"/>
-          <a:chOff x="0" y="0"/>
-          <a:chExt cx="0" cy="0"/>
-        </a:xfrm>
-      </p:grpSpPr>
-      <p:sp>
-        <p:nvSpPr>
-          <p:cNvPr id="104" name="Shape 104"/>
-          <p:cNvSpPr txBox="1">
-            <a:spLocks noGrp="1"/>
-          </p:cNvSpPr>
-          <p:nvPr>
-            <p:ph type="title"/>
-          </p:nvPr>
-        </p:nvSpPr>
-        <p:spPr>
-          <a:xfrm>
-            <a:off x="234450" y="575501"/>
-            <a:ext cx="2046300" cy="915370"/>
-          </a:xfrm>
-          <a:prstGeom prst="rect">
-            <a:avLst/>
-          </a:prstGeom>
-        </p:spPr>
-        <p:txBody>
-          <a:bodyPr spcFirstLastPara="1" wrap="square" lIns="91425" tIns="91425" rIns="91425" bIns="91425" anchor="t" anchorCtr="0">
-            <a:noAutofit/>
-          </a:bodyPr>
-          <a:lstStyle/>
-          <a:p>
-            <a:pPr marL="0" lvl="0" indent="0" algn="just" rtl="0">
-              <a:spcBef>
-                <a:spcPts val="0"/>
-              </a:spcBef>
-              <a:spcAft>
-                <a:spcPts val="0"/>
-              </a:spcAft>
-              <a:buNone/>
-            </a:pPr>
-            <a:r>
-              <a:rPr lang="en-IN" b="1" dirty="0"/>
-              <a:t>Architecture Diagram</a:t>
-            </a:r>
-            <a:endParaRPr b="1" dirty="0"/>
-          </a:p>
-        </p:txBody>
-      </p:sp>
-      <p:sp>
-        <p:nvSpPr>
-          <p:cNvPr id="107" name="Shape 107"/>
-          <p:cNvSpPr txBox="1">
-            <a:spLocks noGrp="1"/>
-          </p:cNvSpPr>
-          <p:nvPr>
-            <p:ph type="sldNum" idx="12"/>
-          </p:nvPr>
-        </p:nvSpPr>
-        <p:spPr>
-          <a:xfrm>
-            <a:off x="8556784" y="4749851"/>
-            <a:ext cx="548700" cy="393600"/>
-          </a:xfrm>
-          <a:prstGeom prst="rect">
-            <a:avLst/>
-          </a:prstGeom>
-        </p:spPr>
-        <p:txBody>
-          <a:bodyPr spcFirstLastPara="1" wrap="square" lIns="91425" tIns="91425" rIns="91425" bIns="91425" anchor="ctr" anchorCtr="0">
-            <a:noAutofit/>
-          </a:bodyPr>
-          <a:lstStyle/>
-          <a:p>
-            <a:pPr marL="0" lvl="0" indent="0">
-              <a:spcBef>
-                <a:spcPts val="0"/>
-              </a:spcBef>
-              <a:spcAft>
-                <a:spcPts val="0"/>
-              </a:spcAft>
-              <a:buNone/>
-            </a:pPr>
-            <a:fld id="{00000000-1234-1234-1234-123412341234}" type="slidenum">
-              <a:rPr lang="en"/>
-              <a:t>12</a:t>
-            </a:fld>
-            <a:endParaRPr dirty="0"/>
-          </a:p>
-        </p:txBody>
-      </p:sp>
-      <p:graphicFrame>
-        <p:nvGraphicFramePr>
-          <p:cNvPr id="2" name="Object 1"/>
-          <p:cNvGraphicFramePr>
-            <a:graphicFrameLocks noChangeAspect="1"/>
-          </p:cNvGraphicFramePr>
-          <p:nvPr>
-            <p:extLst>
-              <p:ext uri="{D42A27DB-BD31-4B8C-83A1-F6EECF244321}">
-                <p14:modId xmlns:p14="http://schemas.microsoft.com/office/powerpoint/2010/main" val="1280438756"/>
-              </p:ext>
-            </p:extLst>
-          </p:nvPr>
-        </p:nvGraphicFramePr>
-        <p:xfrm>
-          <a:off x="2645603" y="279937"/>
-          <a:ext cx="6027737" cy="4662488"/>
-        </p:xfrm>
-        <a:graphic>
-          <a:graphicData uri="http://schemas.openxmlformats.org/presentationml/2006/ole">
-            <mc:AlternateContent xmlns:mc="http://schemas.openxmlformats.org/markup-compatibility/2006">
-              <mc:Choice xmlns:v="urn:schemas-microsoft-com:vml" Requires="v">
-                <p:oleObj spid="_x0000_s1051" name="Acrobat Document" r:id="rId4" imgW="6027385" imgH="4663156" progId="AcroExch.Document.11">
-                  <p:embed/>
-                </p:oleObj>
-              </mc:Choice>
-              <mc:Fallback>
-                <p:oleObj name="Acrobat Document" r:id="rId4" imgW="6027385" imgH="4663156" progId="AcroExch.Document.11">
-                  <p:embed/>
-                  <p:pic>
-                    <p:nvPicPr>
-                      <p:cNvPr id="0" name=""/>
-                      <p:cNvPicPr/>
-                      <p:nvPr/>
-                    </p:nvPicPr>
-                    <p:blipFill>
-                      <a:blip r:embed="rId5"/>
-                      <a:stretch>
-                        <a:fillRect/>
-                      </a:stretch>
-                    </p:blipFill>
-                    <p:spPr>
-                      <a:xfrm>
-                        <a:off x="2645603" y="279937"/>
-                        <a:ext cx="6027737" cy="4662488"/>
-                      </a:xfrm>
-                      <a:prstGeom prst="rect">
-                        <a:avLst/>
-                      </a:prstGeom>
-                    </p:spPr>
-                  </p:pic>
-                </p:oleObj>
-              </mc:Fallback>
-            </mc:AlternateContent>
-          </a:graphicData>
-        </a:graphic>
-      </p:graphicFrame>
     </p:spTree>
     <p:extLst>
       <p:ext uri="{BB962C8B-B14F-4D97-AF65-F5344CB8AC3E}">
@@ -15636,7 +12223,7 @@
                 <a:ea typeface="+mn-ea"/>
                 <a:cs typeface="+mn-cs"/>
               </a:rPr>
-              <a:t>Revenue : 0</a:t>
+              <a:t>Revenue : Nil</a:t>
             </a:r>
           </a:p>
         </p:txBody>
@@ -17571,472 +14158,10 @@
           </a:bodyPr>
           <a:lstStyle/>
           <a:p>
-            <a:pPr marL="0" lvl="0" indent="0">
-              <a:spcBef>
-                <a:spcPts val="0"/>
-              </a:spcBef>
-              <a:spcAft>
-                <a:spcPts val="0"/>
-              </a:spcAft>
-              <a:buNone/>
-            </a:pPr>
-            <a:fld id="{00000000-1234-1234-1234-123412341234}" type="slidenum">
-              <a:rPr lang="en"/>
-              <a:t>8</a:t>
-            </a:fld>
-            <a:endParaRPr dirty="0"/>
-          </a:p>
-        </p:txBody>
-      </p:sp>
-      <p:sp>
-        <p:nvSpPr>
-          <p:cNvPr id="11" name="Shape 114">
-            <a:extLst>
-              <a:ext uri="{FF2B5EF4-FFF2-40B4-BE49-F238E27FC236}">
-                <a16:creationId xmlns:a16="http://schemas.microsoft.com/office/drawing/2014/main" id="{1D3C8554-FECA-4592-9592-A1CD9D928A40}"/>
-              </a:ext>
-            </a:extLst>
-          </p:cNvPr>
-          <p:cNvSpPr txBox="1">
-            <a:spLocks noGrp="1"/>
-          </p:cNvSpPr>
-          <p:nvPr>
-            <p:ph type="body" idx="1"/>
-          </p:nvPr>
-        </p:nvSpPr>
-        <p:spPr>
-          <a:xfrm>
-            <a:off x="2801784" y="225123"/>
-            <a:ext cx="6029350" cy="4731438"/>
-          </a:xfrm>
-          <a:prstGeom prst="rect">
-            <a:avLst/>
-          </a:prstGeom>
-        </p:spPr>
-        <p:txBody>
-          <a:bodyPr spcFirstLastPara="1" wrap="square" lIns="91425" tIns="91425" rIns="91425" bIns="91425" anchor="t" anchorCtr="0">
-            <a:noAutofit/>
-          </a:bodyPr>
-          <a:lstStyle/>
-          <a:p>
-            <a:pPr algn="just"/>
-            <a:r>
-              <a:rPr lang="en-US" i="0" dirty="0">
-                <a:solidFill>
-                  <a:schemeClr val="tx1"/>
-                </a:solidFill>
-                <a:latin typeface="Nunito Sans" panose="020B0604020202020204" charset="0"/>
-              </a:rPr>
-              <a:t>Electronic records allow </a:t>
-            </a:r>
-            <a:r>
-              <a:rPr lang="en-US" b="1" i="0" dirty="0">
-                <a:solidFill>
-                  <a:schemeClr val="tx1"/>
-                </a:solidFill>
-                <a:latin typeface="Nunito Sans" panose="020B0604020202020204" charset="0"/>
-              </a:rPr>
-              <a:t>coordination</a:t>
-            </a:r>
-            <a:r>
-              <a:rPr lang="en-US" i="0" dirty="0">
-                <a:solidFill>
-                  <a:schemeClr val="tx1"/>
-                </a:solidFill>
-                <a:latin typeface="Nunito Sans" panose="020B0604020202020204" charset="0"/>
-              </a:rPr>
-              <a:t> of patient care between clinicians.</a:t>
-            </a:r>
-          </a:p>
-          <a:p>
-            <a:pPr algn="just"/>
-            <a:r>
-              <a:rPr lang="en-US" i="0" dirty="0">
-                <a:solidFill>
-                  <a:schemeClr val="tx1"/>
-                </a:solidFill>
-                <a:latin typeface="Nunito Sans" panose="020B0604020202020204" charset="0"/>
-              </a:rPr>
-              <a:t>They also help control the </a:t>
-            </a:r>
-            <a:r>
-              <a:rPr lang="en-US" b="1" i="0" dirty="0">
-                <a:solidFill>
-                  <a:schemeClr val="tx1"/>
-                </a:solidFill>
-                <a:latin typeface="Nunito Sans" panose="020B0604020202020204" charset="0"/>
-              </a:rPr>
-              <a:t>administrative cost </a:t>
-            </a:r>
-            <a:r>
-              <a:rPr lang="en-US" i="0" dirty="0">
-                <a:solidFill>
-                  <a:schemeClr val="tx1"/>
-                </a:solidFill>
-                <a:latin typeface="Nunito Sans" panose="020B0604020202020204" charset="0"/>
-              </a:rPr>
-              <a:t>of delivering care.</a:t>
-            </a:r>
-          </a:p>
-          <a:p>
-            <a:pPr algn="just"/>
-            <a:r>
-              <a:rPr lang="en-US" i="0" dirty="0">
-                <a:solidFill>
-                  <a:schemeClr val="tx1"/>
-                </a:solidFill>
-                <a:latin typeface="Nunito Sans" panose="020B0604020202020204" charset="0"/>
-              </a:rPr>
-              <a:t>Having uniform standard records on the </a:t>
-            </a:r>
-            <a:r>
-              <a:rPr lang="en-US" b="1" i="0" dirty="0">
-                <a:solidFill>
-                  <a:schemeClr val="tx1"/>
-                </a:solidFill>
-                <a:latin typeface="Nunito Sans" panose="020B0604020202020204" charset="0"/>
-              </a:rPr>
-              <a:t>network</a:t>
-            </a:r>
-            <a:r>
-              <a:rPr lang="en-US" i="0" dirty="0">
-                <a:solidFill>
-                  <a:schemeClr val="tx1"/>
-                </a:solidFill>
-                <a:latin typeface="Nunito Sans" panose="020B0604020202020204" charset="0"/>
-              </a:rPr>
-              <a:t> would ensure interoperability among various </a:t>
-            </a:r>
-            <a:r>
-              <a:rPr lang="en-US" b="1" i="0" dirty="0">
-                <a:solidFill>
-                  <a:schemeClr val="tx1"/>
-                </a:solidFill>
-                <a:latin typeface="Nunito Sans" panose="020B0604020202020204" charset="0"/>
-              </a:rPr>
-              <a:t>healthcare centers </a:t>
-            </a:r>
-            <a:r>
-              <a:rPr lang="en-US" i="0" dirty="0">
-                <a:solidFill>
-                  <a:schemeClr val="tx1"/>
-                </a:solidFill>
-                <a:latin typeface="Nunito Sans" panose="020B0604020202020204" charset="0"/>
-              </a:rPr>
-              <a:t>ensuring </a:t>
-            </a:r>
-            <a:r>
-              <a:rPr lang="en-US" b="1" i="0" dirty="0">
-                <a:solidFill>
-                  <a:schemeClr val="tx1"/>
-                </a:solidFill>
-                <a:latin typeface="Nunito Sans" panose="020B0604020202020204" charset="0"/>
-              </a:rPr>
-              <a:t>robust IT connectivity and digitization</a:t>
-            </a:r>
-            <a:r>
-              <a:rPr lang="en-US" i="0" dirty="0">
-                <a:solidFill>
-                  <a:schemeClr val="tx1"/>
-                </a:solidFill>
-                <a:latin typeface="Nunito Sans" panose="020B0604020202020204" charset="0"/>
-              </a:rPr>
-              <a:t>.</a:t>
-            </a:r>
-          </a:p>
-          <a:p>
-            <a:pPr algn="just"/>
-            <a:r>
-              <a:rPr lang="en-US" i="0" dirty="0">
-                <a:solidFill>
-                  <a:schemeClr val="tx1"/>
-                </a:solidFill>
-                <a:latin typeface="Nunito Sans" panose="020B0604020202020204" charset="0"/>
-              </a:rPr>
-              <a:t>A system that guarantees </a:t>
-            </a:r>
-            <a:r>
-              <a:rPr lang="en-US" b="1" i="0" dirty="0">
-                <a:solidFill>
-                  <a:schemeClr val="tx1"/>
-                </a:solidFill>
-                <a:latin typeface="Nunito Sans" panose="020B0604020202020204" charset="0"/>
-              </a:rPr>
-              <a:t>security</a:t>
-            </a:r>
-            <a:r>
-              <a:rPr lang="en-US" i="0" dirty="0">
-                <a:solidFill>
-                  <a:schemeClr val="tx1"/>
-                </a:solidFill>
-                <a:latin typeface="Nunito Sans" panose="020B0604020202020204" charset="0"/>
-              </a:rPr>
-              <a:t>, </a:t>
-            </a:r>
-            <a:r>
-              <a:rPr lang="en-US" b="1" i="0" dirty="0">
-                <a:solidFill>
-                  <a:schemeClr val="tx1"/>
-                </a:solidFill>
-                <a:latin typeface="Nunito Sans" panose="020B0604020202020204" charset="0"/>
-              </a:rPr>
-              <a:t>interoperability</a:t>
-            </a:r>
-            <a:r>
-              <a:rPr lang="en-US" i="0" dirty="0">
-                <a:solidFill>
-                  <a:schemeClr val="tx1"/>
-                </a:solidFill>
-                <a:latin typeface="Nunito Sans" panose="020B0604020202020204" charset="0"/>
-              </a:rPr>
-              <a:t> and </a:t>
-            </a:r>
-            <a:r>
-              <a:rPr lang="en-US" b="1" i="0" dirty="0">
-                <a:solidFill>
-                  <a:schemeClr val="tx1"/>
-                </a:solidFill>
-                <a:latin typeface="Nunito Sans" panose="020B0604020202020204" charset="0"/>
-              </a:rPr>
-              <a:t>transparency</a:t>
-            </a:r>
-            <a:r>
-              <a:rPr lang="en-US" i="0" dirty="0">
-                <a:solidFill>
-                  <a:schemeClr val="tx1"/>
-                </a:solidFill>
-                <a:latin typeface="Nunito Sans" panose="020B0604020202020204" charset="0"/>
-              </a:rPr>
-              <a:t> will encourage participation by all </a:t>
-            </a:r>
-            <a:r>
-              <a:rPr lang="en-US" b="1" i="0" dirty="0">
-                <a:solidFill>
-                  <a:schemeClr val="tx1"/>
-                </a:solidFill>
-                <a:latin typeface="Nunito Sans" panose="020B0604020202020204" charset="0"/>
-              </a:rPr>
-              <a:t>stakeholders.</a:t>
-            </a:r>
-          </a:p>
-          <a:p>
-            <a:pPr algn="just"/>
-            <a:r>
-              <a:rPr lang="en-US" i="0" dirty="0">
-                <a:solidFill>
-                  <a:schemeClr val="tx1"/>
-                </a:solidFill>
-                <a:latin typeface="Nunito Sans" panose="020B0604020202020204" charset="0"/>
-              </a:rPr>
-              <a:t>The data can be shared with the patients consent not only for diagnosis but to facilitate </a:t>
-            </a:r>
-            <a:r>
-              <a:rPr lang="en-US" b="1" i="0" dirty="0">
-                <a:solidFill>
-                  <a:schemeClr val="tx1"/>
-                </a:solidFill>
-                <a:latin typeface="Nunito Sans" panose="020B0604020202020204" charset="0"/>
-              </a:rPr>
-              <a:t>research</a:t>
-            </a:r>
-            <a:r>
-              <a:rPr lang="en-US" i="0" dirty="0">
-                <a:solidFill>
-                  <a:schemeClr val="tx1"/>
-                </a:solidFill>
-                <a:latin typeface="Nunito Sans" panose="020B0604020202020204" charset="0"/>
-              </a:rPr>
-              <a:t>.</a:t>
-            </a:r>
-          </a:p>
-          <a:p>
-            <a:pPr algn="just"/>
-            <a:r>
-              <a:rPr lang="en-US" i="0" dirty="0">
-                <a:solidFill>
-                  <a:schemeClr val="tx1"/>
-                </a:solidFill>
-                <a:latin typeface="Nunito Sans" panose="020B0604020202020204" charset="0"/>
-              </a:rPr>
-              <a:t>All of these are essentials in </a:t>
-            </a:r>
-            <a:r>
-              <a:rPr lang="en-US" b="1" i="0" dirty="0">
-                <a:solidFill>
-                  <a:schemeClr val="tx1"/>
-                </a:solidFill>
-                <a:latin typeface="Nunito Sans" panose="020B0604020202020204" charset="0"/>
-              </a:rPr>
-              <a:t>smart healthcare </a:t>
-            </a:r>
-            <a:r>
-              <a:rPr lang="en-US" i="0" dirty="0">
-                <a:solidFill>
-                  <a:schemeClr val="tx1"/>
-                </a:solidFill>
-                <a:latin typeface="Nunito Sans" panose="020B0604020202020204" charset="0"/>
-              </a:rPr>
-              <a:t>and certainly in smart cities that are proactive about enhancing livability for their residents.</a:t>
-            </a:r>
-          </a:p>
-          <a:p>
-            <a:pPr algn="just"/>
-            <a:endParaRPr lang="en-US" i="0" dirty="0">
-              <a:solidFill>
-                <a:schemeClr val="tx1"/>
-              </a:solidFill>
-              <a:latin typeface="Nunito Sans" panose="020B0604020202020204" charset="0"/>
-            </a:endParaRPr>
-          </a:p>
-          <a:p>
-            <a:pPr algn="just">
-              <a:buFont typeface="Arial" panose="020B0604020202020204" pitchFamily="34" charset="0"/>
-              <a:buChar char="•"/>
-            </a:pPr>
-            <a:endParaRPr lang="en-US" i="0" dirty="0">
-              <a:solidFill>
-                <a:schemeClr val="tx1"/>
-              </a:solidFill>
-              <a:latin typeface="Nunito Sans" panose="020B0604020202020204" charset="0"/>
-            </a:endParaRPr>
-          </a:p>
-          <a:p>
-            <a:pPr algn="just">
-              <a:buFont typeface="Arial" panose="020B0604020202020204" pitchFamily="34" charset="0"/>
-              <a:buChar char="•"/>
-            </a:pPr>
-            <a:endParaRPr lang="en-US" i="0" dirty="0">
-              <a:solidFill>
-                <a:schemeClr val="tx1"/>
-              </a:solidFill>
-              <a:latin typeface="Nunito Sans" panose="020B0604020202020204" charset="0"/>
-            </a:endParaRPr>
-          </a:p>
-          <a:p>
-            <a:pPr algn="just">
-              <a:buFont typeface="Arial" panose="020B0604020202020204" pitchFamily="34" charset="0"/>
-              <a:buChar char="•"/>
-            </a:pPr>
-            <a:endParaRPr i="0" dirty="0">
-              <a:solidFill>
-                <a:schemeClr val="tx1"/>
-              </a:solidFill>
-              <a:latin typeface="Nunito Sans" panose="020B0604020202020204" charset="0"/>
-            </a:endParaRPr>
-          </a:p>
-        </p:txBody>
-      </p:sp>
-    </p:spTree>
-    <p:extLst>
-      <p:ext uri="{BB962C8B-B14F-4D97-AF65-F5344CB8AC3E}">
-        <p14:creationId xmlns:p14="http://schemas.microsoft.com/office/powerpoint/2010/main" val="3039291923"/>
-      </p:ext>
-    </p:extLst>
-  </p:cSld>
-  <p:clrMapOvr>
-    <a:masterClrMapping/>
-  </p:clrMapOvr>
-</p:sld>
-</file>
-
-<file path=ppt/slides/slide9.xml><?xml version="1.0" encoding="utf-8"?>
-<p:sld xmlns:a="http://schemas.openxmlformats.org/drawingml/2006/main" xmlns:r="http://schemas.openxmlformats.org/officeDocument/2006/relationships" xmlns:p="http://schemas.openxmlformats.org/presentationml/2006/main">
-  <p:cSld>
-    <p:bg>
-      <p:bgPr>
-        <a:solidFill>
-          <a:schemeClr val="accent1">
-            <a:lumMod val="75000"/>
-          </a:schemeClr>
-        </a:solidFill>
-        <a:effectLst/>
-      </p:bgPr>
-    </p:bg>
-    <p:spTree>
-      <p:nvGrpSpPr>
-        <p:cNvPr id="1" name="Shape 103"/>
-        <p:cNvGrpSpPr/>
-        <p:nvPr/>
-      </p:nvGrpSpPr>
-      <p:grpSpPr>
-        <a:xfrm>
-          <a:off x="0" y="0"/>
-          <a:ext cx="0" cy="0"/>
-          <a:chOff x="0" y="0"/>
-          <a:chExt cx="0" cy="0"/>
-        </a:xfrm>
-      </p:grpSpPr>
-      <p:sp>
-        <p:nvSpPr>
-          <p:cNvPr id="104" name="Shape 104"/>
-          <p:cNvSpPr txBox="1">
-            <a:spLocks noGrp="1"/>
-          </p:cNvSpPr>
-          <p:nvPr>
-            <p:ph type="title"/>
-          </p:nvPr>
-        </p:nvSpPr>
-        <p:spPr>
-          <a:xfrm>
-            <a:off x="234450" y="575500"/>
-            <a:ext cx="2046300" cy="817464"/>
-          </a:xfrm>
-          <a:prstGeom prst="rect">
-            <a:avLst/>
-          </a:prstGeom>
-        </p:spPr>
-        <p:txBody>
-          <a:bodyPr spcFirstLastPara="1" wrap="square" lIns="91425" tIns="91425" rIns="91425" bIns="91425" anchor="t" anchorCtr="0">
-            <a:noAutofit/>
-          </a:bodyPr>
-          <a:lstStyle/>
-          <a:p>
-            <a:pPr marL="0" lvl="0" indent="0" rtl="0">
-              <a:spcBef>
-                <a:spcPts val="0"/>
-              </a:spcBef>
-              <a:spcAft>
-                <a:spcPts val="0"/>
-              </a:spcAft>
-              <a:buNone/>
-            </a:pPr>
-            <a:r>
-              <a:rPr lang="en-IN" b="1" dirty="0"/>
-              <a:t>Relevance in Smart City</a:t>
-            </a:r>
-            <a:endParaRPr b="1" dirty="0"/>
-          </a:p>
-        </p:txBody>
-      </p:sp>
-      <p:sp>
-        <p:nvSpPr>
-          <p:cNvPr id="107" name="Shape 107"/>
-          <p:cNvSpPr txBox="1">
-            <a:spLocks noGrp="1"/>
-          </p:cNvSpPr>
-          <p:nvPr>
-            <p:ph type="sldNum" idx="12"/>
-          </p:nvPr>
-        </p:nvSpPr>
-        <p:spPr>
-          <a:xfrm>
-            <a:off x="8556784" y="4749851"/>
-            <a:ext cx="548700" cy="393600"/>
-          </a:xfrm>
-          <a:prstGeom prst="rect">
-            <a:avLst/>
-          </a:prstGeom>
-        </p:spPr>
-        <p:txBody>
-          <a:bodyPr spcFirstLastPara="1" wrap="square" lIns="91425" tIns="91425" rIns="91425" bIns="91425" anchor="ctr" anchorCtr="0">
-            <a:noAutofit/>
-          </a:bodyPr>
-          <a:lstStyle/>
-          <a:p>
             <a:fld id="{00000000-1234-1234-1234-123412341234}" type="slidenum">
               <a:rPr lang="en"/>
               <a:pPr/>
-              <a:t>9</a:t>
+              <a:t>8</a:t>
             </a:fld>
             <a:endParaRPr dirty="0"/>
           </a:p>
@@ -18065,8 +14190,8 @@
         </p:blipFill>
         <p:spPr bwMode="auto">
           <a:xfrm>
-            <a:off x="4961411" y="2147191"/>
-            <a:ext cx="1714500" cy="952500"/>
+            <a:off x="4896740" y="2147191"/>
+            <a:ext cx="1837346" cy="952500"/>
           </a:xfrm>
           <a:prstGeom prst="rect">
             <a:avLst/>
@@ -18721,6 +14846,538 @@
     <p:extLst>
       <p:ext uri="{BB962C8B-B14F-4D97-AF65-F5344CB8AC3E}">
         <p14:creationId xmlns:p14="http://schemas.microsoft.com/office/powerpoint/2010/main" val="3753748887"/>
+      </p:ext>
+    </p:extLst>
+  </p:cSld>
+  <p:clrMapOvr>
+    <a:masterClrMapping/>
+  </p:clrMapOvr>
+</p:sld>
+</file>
+
+<file path=ppt/slides/slide9.xml><?xml version="1.0" encoding="utf-8"?>
+<p:sld xmlns:a="http://schemas.openxmlformats.org/drawingml/2006/main" xmlns:r="http://schemas.openxmlformats.org/officeDocument/2006/relationships" xmlns:p="http://schemas.openxmlformats.org/presentationml/2006/main">
+  <p:cSld>
+    <p:bg>
+      <p:bgPr>
+        <a:solidFill>
+          <a:schemeClr val="accent1">
+            <a:lumMod val="75000"/>
+          </a:schemeClr>
+        </a:solidFill>
+        <a:effectLst/>
+      </p:bgPr>
+    </p:bg>
+    <p:spTree>
+      <p:nvGrpSpPr>
+        <p:cNvPr id="1" name="Shape 103"/>
+        <p:cNvGrpSpPr/>
+        <p:nvPr/>
+      </p:nvGrpSpPr>
+      <p:grpSpPr>
+        <a:xfrm>
+          <a:off x="0" y="0"/>
+          <a:ext cx="0" cy="0"/>
+          <a:chOff x="0" y="0"/>
+          <a:chExt cx="0" cy="0"/>
+        </a:xfrm>
+      </p:grpSpPr>
+      <p:sp>
+        <p:nvSpPr>
+          <p:cNvPr id="104" name="Shape 104"/>
+          <p:cNvSpPr txBox="1">
+            <a:spLocks noGrp="1"/>
+          </p:cNvSpPr>
+          <p:nvPr>
+            <p:ph type="title"/>
+          </p:nvPr>
+        </p:nvSpPr>
+        <p:spPr>
+          <a:xfrm>
+            <a:off x="91952" y="563624"/>
+            <a:ext cx="2485001" cy="817464"/>
+          </a:xfrm>
+          <a:prstGeom prst="rect">
+            <a:avLst/>
+          </a:prstGeom>
+        </p:spPr>
+        <p:txBody>
+          <a:bodyPr spcFirstLastPara="1" wrap="square" lIns="91425" tIns="91425" rIns="91425" bIns="91425" anchor="t" anchorCtr="0">
+            <a:noAutofit/>
+          </a:bodyPr>
+          <a:lstStyle/>
+          <a:p>
+            <a:pPr marL="0" lvl="0" indent="0" rtl="0">
+              <a:spcBef>
+                <a:spcPts val="0"/>
+              </a:spcBef>
+              <a:spcAft>
+                <a:spcPts val="0"/>
+              </a:spcAft>
+              <a:buNone/>
+            </a:pPr>
+            <a:r>
+              <a:rPr lang="en-IN" b="1" dirty="0"/>
+              <a:t>Ease of Implementation</a:t>
+            </a:r>
+            <a:endParaRPr b="1" dirty="0"/>
+          </a:p>
+        </p:txBody>
+      </p:sp>
+      <p:sp>
+        <p:nvSpPr>
+          <p:cNvPr id="107" name="Shape 107"/>
+          <p:cNvSpPr txBox="1">
+            <a:spLocks noGrp="1"/>
+          </p:cNvSpPr>
+          <p:nvPr>
+            <p:ph type="sldNum" idx="12"/>
+          </p:nvPr>
+        </p:nvSpPr>
+        <p:spPr>
+          <a:xfrm>
+            <a:off x="8556784" y="4749851"/>
+            <a:ext cx="548700" cy="393600"/>
+          </a:xfrm>
+          <a:prstGeom prst="rect">
+            <a:avLst/>
+          </a:prstGeom>
+        </p:spPr>
+        <p:txBody>
+          <a:bodyPr spcFirstLastPara="1" wrap="square" lIns="91425" tIns="91425" rIns="91425" bIns="91425" anchor="ctr" anchorCtr="0">
+            <a:noAutofit/>
+          </a:bodyPr>
+          <a:lstStyle/>
+          <a:p>
+            <a:pPr marL="0" lvl="0" indent="0">
+              <a:spcBef>
+                <a:spcPts val="0"/>
+              </a:spcBef>
+              <a:spcAft>
+                <a:spcPts val="0"/>
+              </a:spcAft>
+              <a:buNone/>
+            </a:pPr>
+            <a:fld id="{00000000-1234-1234-1234-123412341234}" type="slidenum">
+              <a:rPr lang="en"/>
+              <a:t>9</a:t>
+            </a:fld>
+            <a:endParaRPr dirty="0"/>
+          </a:p>
+        </p:txBody>
+      </p:sp>
+      <p:sp>
+        <p:nvSpPr>
+          <p:cNvPr id="3" name="Rectangle 2"/>
+          <p:cNvSpPr/>
+          <p:nvPr/>
+        </p:nvSpPr>
+        <p:spPr>
+          <a:xfrm>
+            <a:off x="3022270" y="611580"/>
+            <a:ext cx="5658592" cy="1579418"/>
+          </a:xfrm>
+          <a:prstGeom prst="rect">
+            <a:avLst/>
+          </a:prstGeom>
+          <a:noFill/>
+          <a:ln>
+            <a:solidFill>
+              <a:schemeClr val="bg1">
+                <a:lumMod val="95000"/>
+              </a:schemeClr>
+            </a:solidFill>
+          </a:ln>
+        </p:spPr>
+        <p:style>
+          <a:lnRef idx="2">
+            <a:schemeClr val="accent1">
+              <a:shade val="50000"/>
+            </a:schemeClr>
+          </a:lnRef>
+          <a:fillRef idx="1">
+            <a:schemeClr val="accent1"/>
+          </a:fillRef>
+          <a:effectRef idx="0">
+            <a:schemeClr val="accent1"/>
+          </a:effectRef>
+          <a:fontRef idx="minor">
+            <a:schemeClr val="lt1"/>
+          </a:fontRef>
+        </p:style>
+        <p:txBody>
+          <a:bodyPr rtlCol="0" anchor="ctr"/>
+          <a:lstStyle/>
+          <a:p>
+            <a:pPr algn="ctr"/>
+            <a:endParaRPr lang="en-IN"/>
+          </a:p>
+        </p:txBody>
+      </p:sp>
+      <p:sp>
+        <p:nvSpPr>
+          <p:cNvPr id="4" name="TextBox 3"/>
+          <p:cNvSpPr txBox="1"/>
+          <p:nvPr/>
+        </p:nvSpPr>
+        <p:spPr>
+          <a:xfrm>
+            <a:off x="4792627" y="682653"/>
+            <a:ext cx="2117887" cy="261610"/>
+          </a:xfrm>
+          <a:prstGeom prst="rect">
+            <a:avLst/>
+          </a:prstGeom>
+          <a:noFill/>
+        </p:spPr>
+        <p:txBody>
+          <a:bodyPr wrap="none" rtlCol="0">
+            <a:spAutoFit/>
+          </a:bodyPr>
+          <a:lstStyle/>
+          <a:p>
+            <a:pPr algn="ctr"/>
+            <a:r>
+              <a:rPr lang="en-IN" sz="1100" b="1" dirty="0"/>
+              <a:t>Infrastructural Requirements</a:t>
+            </a:r>
+          </a:p>
+        </p:txBody>
+      </p:sp>
+      <p:sp>
+        <p:nvSpPr>
+          <p:cNvPr id="5" name="TextBox 4"/>
+          <p:cNvSpPr txBox="1"/>
+          <p:nvPr/>
+        </p:nvSpPr>
+        <p:spPr>
+          <a:xfrm>
+            <a:off x="3170719" y="1086661"/>
+            <a:ext cx="5229317" cy="900246"/>
+          </a:xfrm>
+          <a:prstGeom prst="rect">
+            <a:avLst/>
+          </a:prstGeom>
+          <a:noFill/>
+        </p:spPr>
+        <p:txBody>
+          <a:bodyPr wrap="none" rtlCol="0">
+            <a:spAutoFit/>
+          </a:bodyPr>
+          <a:lstStyle/>
+          <a:p>
+            <a:pPr marL="171450" indent="-171450">
+              <a:buFont typeface="Arial" pitchFamily="34" charset="0"/>
+              <a:buChar char="•"/>
+            </a:pPr>
+            <a:r>
+              <a:rPr lang="en-IN" sz="1050" dirty="0"/>
+              <a:t>Virtual Machines(VMs) on any cloud service provider(Azure, AWS)</a:t>
+            </a:r>
+          </a:p>
+          <a:p>
+            <a:pPr marL="171450" indent="-171450">
+              <a:buFont typeface="Arial" pitchFamily="34" charset="0"/>
+              <a:buChar char="•"/>
+            </a:pPr>
+            <a:r>
+              <a:rPr lang="en-IN" sz="1050" dirty="0"/>
+              <a:t>Mobile phones and desktop computers</a:t>
+            </a:r>
+          </a:p>
+          <a:p>
+            <a:pPr marL="171450" indent="-171450">
+              <a:buFont typeface="Arial" pitchFamily="34" charset="0"/>
+              <a:buChar char="•"/>
+            </a:pPr>
+            <a:r>
+              <a:rPr lang="en-IN" sz="1050" dirty="0"/>
+              <a:t>IT enable the hospitals – establish network, hardware including bio-metric module</a:t>
+            </a:r>
+          </a:p>
+          <a:p>
+            <a:pPr marL="171450" indent="-171450">
+              <a:buFont typeface="Arial" pitchFamily="34" charset="0"/>
+              <a:buChar char="•"/>
+            </a:pPr>
+            <a:endParaRPr lang="en-IN" sz="1050" dirty="0"/>
+          </a:p>
+          <a:p>
+            <a:pPr marL="171450" indent="-171450">
+              <a:buFont typeface="Arial" pitchFamily="34" charset="0"/>
+              <a:buChar char="•"/>
+            </a:pPr>
+            <a:endParaRPr lang="en-IN" sz="1050" dirty="0"/>
+          </a:p>
+        </p:txBody>
+      </p:sp>
+      <p:sp>
+        <p:nvSpPr>
+          <p:cNvPr id="9" name="Rectangle 8"/>
+          <p:cNvSpPr/>
+          <p:nvPr/>
+        </p:nvSpPr>
+        <p:spPr>
+          <a:xfrm>
+            <a:off x="3022270" y="2557479"/>
+            <a:ext cx="5658592" cy="2394448"/>
+          </a:xfrm>
+          <a:prstGeom prst="rect">
+            <a:avLst/>
+          </a:prstGeom>
+          <a:noFill/>
+          <a:ln>
+            <a:solidFill>
+              <a:schemeClr val="bg1">
+                <a:lumMod val="95000"/>
+              </a:schemeClr>
+            </a:solidFill>
+          </a:ln>
+        </p:spPr>
+        <p:style>
+          <a:lnRef idx="2">
+            <a:schemeClr val="accent1">
+              <a:shade val="50000"/>
+            </a:schemeClr>
+          </a:lnRef>
+          <a:fillRef idx="1">
+            <a:schemeClr val="accent1"/>
+          </a:fillRef>
+          <a:effectRef idx="0">
+            <a:schemeClr val="accent1"/>
+          </a:effectRef>
+          <a:fontRef idx="minor">
+            <a:schemeClr val="lt1"/>
+          </a:fontRef>
+        </p:style>
+        <p:txBody>
+          <a:bodyPr rtlCol="0" anchor="ctr"/>
+          <a:lstStyle/>
+          <a:p>
+            <a:pPr algn="ctr"/>
+            <a:endParaRPr lang="en-IN"/>
+          </a:p>
+        </p:txBody>
+      </p:sp>
+      <p:sp>
+        <p:nvSpPr>
+          <p:cNvPr id="10" name="TextBox 9"/>
+          <p:cNvSpPr txBox="1"/>
+          <p:nvPr/>
+        </p:nvSpPr>
+        <p:spPr>
+          <a:xfrm>
+            <a:off x="5316002" y="2628549"/>
+            <a:ext cx="1071126" cy="261610"/>
+          </a:xfrm>
+          <a:prstGeom prst="rect">
+            <a:avLst/>
+          </a:prstGeom>
+          <a:noFill/>
+        </p:spPr>
+        <p:txBody>
+          <a:bodyPr wrap="none" rtlCol="0">
+            <a:spAutoFit/>
+          </a:bodyPr>
+          <a:lstStyle/>
+          <a:p>
+            <a:pPr algn="ctr"/>
+            <a:r>
+              <a:rPr lang="en-IN" sz="1100" b="1" dirty="0"/>
+              <a:t>Stakeholders</a:t>
+            </a:r>
+          </a:p>
+        </p:txBody>
+      </p:sp>
+      <p:sp>
+        <p:nvSpPr>
+          <p:cNvPr id="12" name="TextBox 11"/>
+          <p:cNvSpPr txBox="1"/>
+          <p:nvPr/>
+        </p:nvSpPr>
+        <p:spPr>
+          <a:xfrm>
+            <a:off x="3170717" y="3032557"/>
+            <a:ext cx="5347939" cy="1708160"/>
+          </a:xfrm>
+          <a:prstGeom prst="rect">
+            <a:avLst/>
+          </a:prstGeom>
+          <a:noFill/>
+        </p:spPr>
+        <p:txBody>
+          <a:bodyPr wrap="none" rtlCol="0">
+            <a:spAutoFit/>
+          </a:bodyPr>
+          <a:lstStyle/>
+          <a:p>
+            <a:pPr marL="171450" indent="-171450">
+              <a:buFont typeface="Arial" pitchFamily="34" charset="0"/>
+              <a:buChar char="•"/>
+            </a:pPr>
+            <a:r>
+              <a:rPr lang="en-IN" sz="1050" dirty="0"/>
+              <a:t>Medical records will be accessed over the </a:t>
+            </a:r>
+            <a:r>
+              <a:rPr lang="en-IN" sz="1050" b="1" dirty="0"/>
+              <a:t>Internet</a:t>
+            </a:r>
+            <a:r>
+              <a:rPr lang="en-IN" sz="1050" dirty="0"/>
+              <a:t> demanding people to be familiar</a:t>
+            </a:r>
+          </a:p>
+          <a:p>
+            <a:r>
+              <a:rPr lang="en-IN" sz="1050" dirty="0"/>
+              <a:t>     with internet.</a:t>
+            </a:r>
+          </a:p>
+          <a:p>
+            <a:pPr marL="171450" indent="-171450">
+              <a:buFont typeface="Arial" pitchFamily="34" charset="0"/>
+              <a:buChar char="•"/>
+            </a:pPr>
+            <a:r>
+              <a:rPr lang="en-IN" sz="1050" dirty="0"/>
+              <a:t>People with internet access can avail the services </a:t>
+            </a:r>
+            <a:r>
+              <a:rPr lang="en-IN" sz="1050" b="1" dirty="0"/>
+              <a:t>using web application</a:t>
+            </a:r>
+            <a:r>
+              <a:rPr lang="en-IN" sz="1050" dirty="0"/>
+              <a:t>.</a:t>
+            </a:r>
+          </a:p>
+          <a:p>
+            <a:pPr marL="171450" indent="-171450">
+              <a:buFont typeface="Arial" pitchFamily="34" charset="0"/>
+              <a:buChar char="•"/>
+            </a:pPr>
+            <a:r>
+              <a:rPr lang="en-IN" sz="1050" dirty="0"/>
+              <a:t>People without internet access can visit the nearby hospital and avail the service</a:t>
+            </a:r>
+          </a:p>
+          <a:p>
+            <a:r>
+              <a:rPr lang="en-IN" sz="1050" dirty="0"/>
+              <a:t>     (</a:t>
+            </a:r>
+            <a:r>
+              <a:rPr lang="en-IN" sz="1050" b="1" dirty="0"/>
+              <a:t>using bio-metric authentication</a:t>
+            </a:r>
+            <a:r>
+              <a:rPr lang="en-IN" sz="1050" dirty="0"/>
+              <a:t>).</a:t>
+            </a:r>
+          </a:p>
+          <a:p>
+            <a:pPr marL="171450" indent="-171450">
+              <a:buFont typeface="Arial" pitchFamily="34" charset="0"/>
+              <a:buChar char="•"/>
+            </a:pPr>
+            <a:r>
+              <a:rPr lang="en-IN" sz="1050" dirty="0"/>
+              <a:t>For hospitals, shifting from their </a:t>
+            </a:r>
+            <a:r>
+              <a:rPr lang="en-IN" sz="1050" b="1" dirty="0"/>
+              <a:t>traditional/current</a:t>
+            </a:r>
+            <a:r>
+              <a:rPr lang="en-IN" sz="1050" dirty="0"/>
+              <a:t> system to </a:t>
+            </a:r>
+            <a:r>
+              <a:rPr lang="en-IN" sz="1050" b="1" dirty="0"/>
+              <a:t>blockchain based </a:t>
+            </a:r>
+          </a:p>
+          <a:p>
+            <a:r>
+              <a:rPr lang="en-IN" sz="1050" b="1" dirty="0"/>
+              <a:t>     scheme </a:t>
+            </a:r>
+            <a:r>
+              <a:rPr lang="en-IN" sz="1050" dirty="0"/>
+              <a:t>might be challenging but the </a:t>
+            </a:r>
+            <a:r>
+              <a:rPr lang="en-IN" sz="1050" b="1" dirty="0"/>
+              <a:t>future</a:t>
+            </a:r>
+            <a:r>
+              <a:rPr lang="en-IN" sz="1050" dirty="0"/>
+              <a:t> outcome would be </a:t>
+            </a:r>
+            <a:r>
+              <a:rPr lang="en-IN" sz="1050" b="1" dirty="0"/>
+              <a:t>highly beneficial</a:t>
+            </a:r>
+            <a:r>
+              <a:rPr lang="en-IN" sz="1050" dirty="0"/>
+              <a:t>.</a:t>
+            </a:r>
+          </a:p>
+          <a:p>
+            <a:pPr marL="171450" indent="-171450">
+              <a:buFont typeface="Arial" pitchFamily="34" charset="0"/>
+              <a:buChar char="•"/>
+            </a:pPr>
+            <a:r>
+              <a:rPr lang="en-IN" sz="1050" b="1" dirty="0"/>
+              <a:t>Partnership</a:t>
+            </a:r>
+            <a:r>
+              <a:rPr lang="en-IN" sz="1050" dirty="0"/>
+              <a:t> with </a:t>
+            </a:r>
+            <a:r>
+              <a:rPr lang="en-IN" sz="1050" b="1" dirty="0"/>
+              <a:t>MNCs</a:t>
+            </a:r>
+            <a:r>
+              <a:rPr lang="en-IN" sz="1050" dirty="0"/>
+              <a:t> for large scale </a:t>
+            </a:r>
+            <a:r>
+              <a:rPr lang="en-IN" sz="1050" b="1" dirty="0"/>
+              <a:t>deployment</a:t>
+            </a:r>
+            <a:r>
+              <a:rPr lang="en-IN" sz="1050" dirty="0"/>
+              <a:t> of software as well as </a:t>
+            </a:r>
+            <a:r>
+              <a:rPr lang="en-IN" sz="1050" b="1" dirty="0"/>
+              <a:t>training</a:t>
+            </a:r>
+            <a:r>
+              <a:rPr lang="en-IN" sz="1050" dirty="0"/>
+              <a:t>.</a:t>
+            </a:r>
+          </a:p>
+          <a:p>
+            <a:endParaRPr lang="en-IN" sz="1050" dirty="0"/>
+          </a:p>
+          <a:p>
+            <a:pPr marL="171450" indent="-171450">
+              <a:buFont typeface="Arial" pitchFamily="34" charset="0"/>
+              <a:buChar char="•"/>
+            </a:pPr>
+            <a:endParaRPr lang="en-IN" sz="1050" dirty="0"/>
+          </a:p>
+        </p:txBody>
+      </p:sp>
+    </p:spTree>
+    <p:extLst>
+      <p:ext uri="{BB962C8B-B14F-4D97-AF65-F5344CB8AC3E}">
+        <p14:creationId xmlns:p14="http://schemas.microsoft.com/office/powerpoint/2010/main" val="3992344039"/>
       </p:ext>
     </p:extLst>
   </p:cSld>

</xml_diff>